<commit_message>
nueva organozación del curso
</commit_message>
<xml_diff>
--- a/slides/inicial.pptx
+++ b/slides/inicial.pptx
@@ -154,38 +154,37 @@
           <c:yMode val="edge"/>
           <c:x val="6.949787084285261E-2"/>
           <c:y val="0"/>
-          <c:w val="0.36895823666133054"/>
+          <c:w val="0.89377033092533653"/>
           <c:h val="0.92741933388924824"/>
         </c:manualLayout>
       </c:layout>
-      <c:pieChart>
-        <c:varyColors val="1"/>
+      <c:barChart>
+        <c:barDir val="col"/>
+        <c:grouping val="clustered"/>
+        <c:varyColors val="0"/>
         <c:ser>
           <c:idx val="0"/>
           <c:order val="0"/>
-          <c:explosion val="5"/>
+          <c:spPr>
+            <a:solidFill>
+              <a:schemeClr val="accent1"/>
+            </a:solidFill>
+            <a:ln>
+              <a:noFill/>
+            </a:ln>
+            <a:effectLst/>
+          </c:spPr>
+          <c:invertIfNegative val="0"/>
           <c:dPt>
             <c:idx val="0"/>
+            <c:invertIfNegative val="0"/>
             <c:bubble3D val="0"/>
             <c:spPr>
-              <a:gradFill>
-                <a:gsLst>
-                  <a:gs pos="100000">
-                    <a:schemeClr val="accent1">
-                      <a:lumMod val="60000"/>
-                      <a:lumOff val="40000"/>
-                    </a:schemeClr>
-                  </a:gs>
-                  <a:gs pos="0">
-                    <a:schemeClr val="accent1"/>
-                  </a:gs>
-                </a:gsLst>
-                <a:lin ang="5400000" scaled="0"/>
-              </a:gradFill>
-              <a:ln w="19050">
-                <a:solidFill>
-                  <a:schemeClr val="lt1"/>
-                </a:solidFill>
+              <a:solidFill>
+                <a:schemeClr val="accent1"/>
+              </a:solidFill>
+              <a:ln>
+                <a:noFill/>
               </a:ln>
               <a:effectLst/>
             </c:spPr>
@@ -197,27 +196,15 @@
           </c:dPt>
           <c:dPt>
             <c:idx val="1"/>
+            <c:invertIfNegative val="0"/>
             <c:bubble3D val="0"/>
             <c:explosion val="9"/>
             <c:spPr>
-              <a:gradFill>
-                <a:gsLst>
-                  <a:gs pos="100000">
-                    <a:schemeClr val="accent2">
-                      <a:lumMod val="60000"/>
-                      <a:lumOff val="40000"/>
-                    </a:schemeClr>
-                  </a:gs>
-                  <a:gs pos="0">
-                    <a:schemeClr val="accent2"/>
-                  </a:gs>
-                </a:gsLst>
-                <a:lin ang="5400000" scaled="0"/>
-              </a:gradFill>
-              <a:ln w="19050">
-                <a:solidFill>
-                  <a:schemeClr val="lt1"/>
-                </a:solidFill>
+              <a:solidFill>
+                <a:schemeClr val="accent1"/>
+              </a:solidFill>
+              <a:ln>
+                <a:noFill/>
               </a:ln>
               <a:effectLst/>
             </c:spPr>
@@ -229,26 +216,14 @@
           </c:dPt>
           <c:dPt>
             <c:idx val="2"/>
+            <c:invertIfNegative val="0"/>
             <c:bubble3D val="0"/>
             <c:spPr>
-              <a:gradFill>
-                <a:gsLst>
-                  <a:gs pos="100000">
-                    <a:schemeClr val="accent3">
-                      <a:lumMod val="60000"/>
-                      <a:lumOff val="40000"/>
-                    </a:schemeClr>
-                  </a:gs>
-                  <a:gs pos="0">
-                    <a:schemeClr val="accent3"/>
-                  </a:gs>
-                </a:gsLst>
-                <a:lin ang="5400000" scaled="0"/>
-              </a:gradFill>
-              <a:ln w="19050">
-                <a:solidFill>
-                  <a:schemeClr val="lt1"/>
-                </a:solidFill>
+              <a:solidFill>
+                <a:schemeClr val="accent1"/>
+              </a:solidFill>
+              <a:ln>
+                <a:noFill/>
               </a:ln>
               <a:effectLst/>
             </c:spPr>
@@ -260,26 +235,14 @@
           </c:dPt>
           <c:dPt>
             <c:idx val="3"/>
+            <c:invertIfNegative val="0"/>
             <c:bubble3D val="0"/>
             <c:spPr>
-              <a:gradFill>
-                <a:gsLst>
-                  <a:gs pos="100000">
-                    <a:schemeClr val="accent4">
-                      <a:lumMod val="60000"/>
-                      <a:lumOff val="40000"/>
-                    </a:schemeClr>
-                  </a:gs>
-                  <a:gs pos="0">
-                    <a:schemeClr val="accent4"/>
-                  </a:gs>
-                </a:gsLst>
-                <a:lin ang="5400000" scaled="0"/>
-              </a:gradFill>
-              <a:ln w="19050">
-                <a:solidFill>
-                  <a:schemeClr val="lt1"/>
-                </a:solidFill>
+              <a:solidFill>
+                <a:schemeClr val="accent1"/>
+              </a:solidFill>
+              <a:ln>
+                <a:noFill/>
               </a:ln>
               <a:effectLst/>
             </c:spPr>
@@ -291,26 +254,14 @@
           </c:dPt>
           <c:dPt>
             <c:idx val="4"/>
+            <c:invertIfNegative val="0"/>
             <c:bubble3D val="0"/>
             <c:spPr>
-              <a:gradFill>
-                <a:gsLst>
-                  <a:gs pos="100000">
-                    <a:schemeClr val="accent5">
-                      <a:lumMod val="60000"/>
-                      <a:lumOff val="40000"/>
-                    </a:schemeClr>
-                  </a:gs>
-                  <a:gs pos="0">
-                    <a:schemeClr val="accent5"/>
-                  </a:gs>
-                </a:gsLst>
-                <a:lin ang="5400000" scaled="0"/>
-              </a:gradFill>
-              <a:ln w="19050">
-                <a:solidFill>
-                  <a:schemeClr val="lt1"/>
-                </a:solidFill>
+              <a:solidFill>
+                <a:schemeClr val="accent1"/>
+              </a:solidFill>
+              <a:ln>
+                <a:noFill/>
               </a:ln>
               <a:effectLst/>
             </c:spPr>
@@ -322,26 +273,14 @@
           </c:dPt>
           <c:dPt>
             <c:idx val="5"/>
+            <c:invertIfNegative val="0"/>
             <c:bubble3D val="0"/>
             <c:spPr>
-              <a:gradFill>
-                <a:gsLst>
-                  <a:gs pos="100000">
-                    <a:schemeClr val="accent6">
-                      <a:lumMod val="60000"/>
-                      <a:lumOff val="40000"/>
-                    </a:schemeClr>
-                  </a:gs>
-                  <a:gs pos="0">
-                    <a:schemeClr val="accent6"/>
-                  </a:gs>
-                </a:gsLst>
-                <a:lin ang="5400000" scaled="0"/>
-              </a:gradFill>
-              <a:ln w="19050">
-                <a:solidFill>
-                  <a:schemeClr val="lt1"/>
-                </a:solidFill>
+              <a:solidFill>
+                <a:schemeClr val="accent1"/>
+              </a:solidFill>
+              <a:ln>
+                <a:noFill/>
               </a:ln>
               <a:effectLst/>
             </c:spPr>
@@ -352,138 +291,6 @@
             </c:extLst>
           </c:dPt>
           <c:dLbls>
-            <c:dLbl>
-              <c:idx val="0"/>
-              <c:layout>
-                <c:manualLayout>
-                  <c:x val="-6.2720298987644821E-2"/>
-                  <c:y val="-4.23934629654701E-2"/>
-                </c:manualLayout>
-              </c:layout>
-              <c:dLblPos val="bestFit"/>
-              <c:showLegendKey val="0"/>
-              <c:showVal val="0"/>
-              <c:showCatName val="0"/>
-              <c:showSerName val="0"/>
-              <c:showPercent val="1"/>
-              <c:showBubbleSize val="0"/>
-              <c:extLst>
-                <c:ext xmlns:c15="http://schemas.microsoft.com/office/drawing/2012/chart" uri="{CE6537A1-D6FC-4f65-9D91-7224C49458BB}"/>
-                <c:ext xmlns:c16="http://schemas.microsoft.com/office/drawing/2014/chart" uri="{C3380CC4-5D6E-409C-BE32-E72D297353CC}">
-                  <c16:uniqueId val="{00000001-0376-F849-96D3-B8E72E681E63}"/>
-                </c:ext>
-              </c:extLst>
-            </c:dLbl>
-            <c:dLbl>
-              <c:idx val="1"/>
-              <c:layout>
-                <c:manualLayout>
-                  <c:x val="5.5839001799714003E-2"/>
-                  <c:y val="-4.7140255039365565E-2"/>
-                </c:manualLayout>
-              </c:layout>
-              <c:dLblPos val="bestFit"/>
-              <c:showLegendKey val="0"/>
-              <c:showVal val="0"/>
-              <c:showCatName val="0"/>
-              <c:showSerName val="0"/>
-              <c:showPercent val="1"/>
-              <c:showBubbleSize val="0"/>
-              <c:extLst>
-                <c:ext xmlns:c15="http://schemas.microsoft.com/office/drawing/2012/chart" uri="{CE6537A1-D6FC-4f65-9D91-7224C49458BB}"/>
-                <c:ext xmlns:c16="http://schemas.microsoft.com/office/drawing/2014/chart" uri="{C3380CC4-5D6E-409C-BE32-E72D297353CC}">
-                  <c16:uniqueId val="{00000003-0376-F849-96D3-B8E72E681E63}"/>
-                </c:ext>
-              </c:extLst>
-            </c:dLbl>
-            <c:dLbl>
-              <c:idx val="2"/>
-              <c:layout>
-                <c:manualLayout>
-                  <c:x val="4.9461323755399536E-2"/>
-                  <c:y val="4.4368385949495465E-2"/>
-                </c:manualLayout>
-              </c:layout>
-              <c:dLblPos val="bestFit"/>
-              <c:showLegendKey val="0"/>
-              <c:showVal val="0"/>
-              <c:showCatName val="0"/>
-              <c:showSerName val="0"/>
-              <c:showPercent val="1"/>
-              <c:showBubbleSize val="0"/>
-              <c:extLst>
-                <c:ext xmlns:c15="http://schemas.microsoft.com/office/drawing/2012/chart" uri="{CE6537A1-D6FC-4f65-9D91-7224C49458BB}"/>
-                <c:ext xmlns:c16="http://schemas.microsoft.com/office/drawing/2014/chart" uri="{C3380CC4-5D6E-409C-BE32-E72D297353CC}">
-                  <c16:uniqueId val="{00000005-0376-F849-96D3-B8E72E681E63}"/>
-                </c:ext>
-              </c:extLst>
-            </c:dLbl>
-            <c:dLbl>
-              <c:idx val="3"/>
-              <c:layout>
-                <c:manualLayout>
-                  <c:x val="4.0011587275125111E-2"/>
-                  <c:y val="8.9375076309977569E-2"/>
-                </c:manualLayout>
-              </c:layout>
-              <c:dLblPos val="bestFit"/>
-              <c:showLegendKey val="0"/>
-              <c:showVal val="0"/>
-              <c:showCatName val="0"/>
-              <c:showSerName val="0"/>
-              <c:showPercent val="1"/>
-              <c:showBubbleSize val="0"/>
-              <c:extLst>
-                <c:ext xmlns:c15="http://schemas.microsoft.com/office/drawing/2012/chart" uri="{CE6537A1-D6FC-4f65-9D91-7224C49458BB}"/>
-                <c:ext xmlns:c16="http://schemas.microsoft.com/office/drawing/2014/chart" uri="{C3380CC4-5D6E-409C-BE32-E72D297353CC}">
-                  <c16:uniqueId val="{00000007-0376-F849-96D3-B8E72E681E63}"/>
-                </c:ext>
-              </c:extLst>
-            </c:dLbl>
-            <c:dLbl>
-              <c:idx val="4"/>
-              <c:layout>
-                <c:manualLayout>
-                  <c:x val="3.2211817883541466E-2"/>
-                  <c:y val="8.7694803280145464E-2"/>
-                </c:manualLayout>
-              </c:layout>
-              <c:dLblPos val="bestFit"/>
-              <c:showLegendKey val="0"/>
-              <c:showVal val="0"/>
-              <c:showCatName val="0"/>
-              <c:showSerName val="0"/>
-              <c:showPercent val="1"/>
-              <c:showBubbleSize val="0"/>
-              <c:extLst>
-                <c:ext xmlns:c15="http://schemas.microsoft.com/office/drawing/2012/chart" uri="{CE6537A1-D6FC-4f65-9D91-7224C49458BB}"/>
-                <c:ext xmlns:c16="http://schemas.microsoft.com/office/drawing/2014/chart" uri="{C3380CC4-5D6E-409C-BE32-E72D297353CC}">
-                  <c16:uniqueId val="{00000009-0376-F849-96D3-B8E72E681E63}"/>
-                </c:ext>
-              </c:extLst>
-            </c:dLbl>
-            <c:dLbl>
-              <c:idx val="5"/>
-              <c:layout>
-                <c:manualLayout>
-                  <c:x val="1.4064380719933243E-2"/>
-                  <c:y val="5.5400213128057062E-2"/>
-                </c:manualLayout>
-              </c:layout>
-              <c:dLblPos val="bestFit"/>
-              <c:showLegendKey val="0"/>
-              <c:showVal val="0"/>
-              <c:showCatName val="0"/>
-              <c:showSerName val="0"/>
-              <c:showPercent val="1"/>
-              <c:showBubbleSize val="0"/>
-              <c:extLst>
-                <c:ext xmlns:c15="http://schemas.microsoft.com/office/drawing/2012/chart" uri="{CE6537A1-D6FC-4f65-9D91-7224C49458BB}"/>
-                <c:ext xmlns:c16="http://schemas.microsoft.com/office/drawing/2014/chart" uri="{C3380CC4-5D6E-409C-BE32-E72D297353CC}">
-                  <c16:uniqueId val="{0000000B-0376-F849-96D3-B8E72E681E63}"/>
-                </c:ext>
-              </c:extLst>
-            </c:dLbl>
             <c:spPr>
               <a:noFill/>
               <a:ln>
@@ -498,9 +305,9 @@
               <a:lstStyle/>
               <a:p>
                 <a:pPr>
-                  <a:defRPr sz="1800" b="0" i="0" u="none" strike="noStrike" kern="1200" baseline="0">
+                  <a:defRPr sz="1197" b="0" i="0" u="none" strike="noStrike" kern="1200" baseline="0">
                     <a:solidFill>
-                      <a:schemeClr val="dk1">
+                      <a:schemeClr val="tx1">
                         <a:lumMod val="75000"/>
                         <a:lumOff val="25000"/>
                       </a:schemeClr>
@@ -513,30 +320,32 @@
                 <a:endParaRPr lang="es-MX"/>
               </a:p>
             </c:txPr>
-            <c:dLblPos val="ctr"/>
+            <c:dLblPos val="inEnd"/>
             <c:showLegendKey val="0"/>
-            <c:showVal val="0"/>
+            <c:showVal val="1"/>
             <c:showCatName val="0"/>
             <c:showSerName val="0"/>
-            <c:showPercent val="1"/>
+            <c:showPercent val="0"/>
             <c:showBubbleSize val="0"/>
-            <c:showLeaderLines val="1"/>
-            <c:leaderLines>
-              <c:spPr>
-                <a:ln w="9525" cap="flat" cmpd="sng" algn="ctr">
-                  <a:solidFill>
-                    <a:schemeClr val="dk1">
-                      <a:lumMod val="35000"/>
-                      <a:lumOff val="65000"/>
-                    </a:schemeClr>
-                  </a:solidFill>
-                  <a:round/>
-                </a:ln>
-                <a:effectLst/>
-              </c:spPr>
-            </c:leaderLines>
+            <c:showLeaderLines val="0"/>
             <c:extLst>
-              <c:ext xmlns:c15="http://schemas.microsoft.com/office/drawing/2012/chart" uri="{CE6537A1-D6FC-4f65-9D91-7224C49458BB}"/>
+              <c:ext xmlns:c15="http://schemas.microsoft.com/office/drawing/2012/chart" uri="{CE6537A1-D6FC-4f65-9D91-7224C49458BB}">
+                <c15:showLeaderLines val="1"/>
+                <c15:leaderLines>
+                  <c:spPr>
+                    <a:ln w="9525" cap="flat" cmpd="sng" algn="ctr">
+                      <a:solidFill>
+                        <a:schemeClr val="tx1">
+                          <a:lumMod val="35000"/>
+                          <a:lumOff val="65000"/>
+                        </a:schemeClr>
+                      </a:solidFill>
+                      <a:round/>
+                    </a:ln>
+                    <a:effectLst/>
+                  </c:spPr>
+                </c15:leaderLines>
+              </c:ext>
             </c:extLst>
           </c:dLbls>
           <c:cat>
@@ -599,75 +408,127 @@
           </c:extLst>
         </c:ser>
         <c:dLbls>
-          <c:dLblPos val="ctr"/>
+          <c:dLblPos val="inEnd"/>
           <c:showLegendKey val="0"/>
-          <c:showVal val="0"/>
+          <c:showVal val="1"/>
           <c:showCatName val="0"/>
           <c:showSerName val="0"/>
-          <c:showPercent val="1"/>
+          <c:showPercent val="0"/>
           <c:showBubbleSize val="0"/>
-          <c:showLeaderLines val="1"/>
         </c:dLbls>
-        <c:firstSliceAng val="0"/>
-      </c:pieChart>
+        <c:gapWidth val="50"/>
+        <c:overlap val="-13"/>
+        <c:axId val="1554787968"/>
+        <c:axId val="1554786240"/>
+      </c:barChart>
+      <c:valAx>
+        <c:axId val="1554786240"/>
+        <c:scaling>
+          <c:orientation val="minMax"/>
+        </c:scaling>
+        <c:delete val="0"/>
+        <c:axPos val="l"/>
+        <c:numFmt formatCode="0%" sourceLinked="1"/>
+        <c:majorTickMark val="none"/>
+        <c:minorTickMark val="none"/>
+        <c:tickLblPos val="nextTo"/>
+        <c:spPr>
+          <a:noFill/>
+          <a:ln>
+            <a:noFill/>
+          </a:ln>
+          <a:effectLst/>
+        </c:spPr>
+        <c:txPr>
+          <a:bodyPr rot="-60000000" spcFirstLastPara="1" vertOverflow="ellipsis" vert="horz" wrap="square" anchor="ctr" anchorCtr="1"/>
+          <a:lstStyle/>
+          <a:p>
+            <a:pPr>
+              <a:defRPr sz="1197" b="0" i="0" u="none" strike="noStrike" kern="1200" baseline="0">
+                <a:solidFill>
+                  <a:schemeClr val="tx1">
+                    <a:lumMod val="65000"/>
+                    <a:lumOff val="35000"/>
+                    <a:alpha val="0"/>
+                  </a:schemeClr>
+                </a:solidFill>
+                <a:latin typeface="+mn-lt"/>
+                <a:ea typeface="+mn-ea"/>
+                <a:cs typeface="+mn-cs"/>
+              </a:defRPr>
+            </a:pPr>
+            <a:endParaRPr lang="es-MX"/>
+          </a:p>
+        </c:txPr>
+        <c:crossAx val="1554787968"/>
+        <c:crossBetween val="between"/>
+      </c:valAx>
+      <c:catAx>
+        <c:axId val="1554787968"/>
+        <c:scaling>
+          <c:orientation val="minMax"/>
+        </c:scaling>
+        <c:delete val="0"/>
+        <c:axPos val="b"/>
+        <c:numFmt formatCode="General" sourceLinked="1"/>
+        <c:majorTickMark val="none"/>
+        <c:minorTickMark val="none"/>
+        <c:tickLblPos val="nextTo"/>
+        <c:spPr>
+          <a:noFill/>
+          <a:ln w="9525" cap="flat" cmpd="sng" algn="ctr">
+            <a:solidFill>
+              <a:schemeClr val="tx1">
+                <a:lumMod val="15000"/>
+                <a:lumOff val="85000"/>
+              </a:schemeClr>
+            </a:solidFill>
+            <a:round/>
+          </a:ln>
+          <a:effectLst/>
+        </c:spPr>
+        <c:txPr>
+          <a:bodyPr rot="-60000000" spcFirstLastPara="1" vertOverflow="ellipsis" vert="horz" wrap="square" anchor="ctr" anchorCtr="1"/>
+          <a:lstStyle/>
+          <a:p>
+            <a:pPr>
+              <a:defRPr sz="1197" b="0" i="0" u="none" strike="noStrike" kern="1200" baseline="0">
+                <a:solidFill>
+                  <a:schemeClr val="tx1">
+                    <a:lumMod val="65000"/>
+                    <a:lumOff val="35000"/>
+                  </a:schemeClr>
+                </a:solidFill>
+                <a:latin typeface="+mn-lt"/>
+                <a:ea typeface="+mn-ea"/>
+                <a:cs typeface="+mn-cs"/>
+              </a:defRPr>
+            </a:pPr>
+            <a:endParaRPr lang="es-MX"/>
+          </a:p>
+        </c:txPr>
+        <c:crossAx val="1554786240"/>
+        <c:auto val="1"/>
+        <c:lblAlgn val="ctr"/>
+        <c:lblOffset val="100"/>
+        <c:noMultiLvlLbl val="0"/>
+      </c:catAx>
       <c:spPr>
         <a:noFill/>
-        <a:ln>
+        <a:ln w="25400">
           <a:noFill/>
         </a:ln>
         <a:effectLst/>
       </c:spPr>
     </c:plotArea>
-    <c:legend>
-      <c:legendPos val="r"/>
-      <c:layout>
-        <c:manualLayout>
-          <c:xMode val="edge"/>
-          <c:yMode val="edge"/>
-          <c:x val="0.47838488307858168"/>
-          <c:y val="7.0164895998325538E-2"/>
-          <c:w val="0.51462754713790482"/>
-          <c:h val="0.85967020800334892"/>
-        </c:manualLayout>
-      </c:layout>
-      <c:overlay val="0"/>
-      <c:spPr>
-        <a:noFill/>
-        <a:ln>
-          <a:noFill/>
-        </a:ln>
-        <a:effectLst/>
-      </c:spPr>
-      <c:txPr>
-        <a:bodyPr rot="0" spcFirstLastPara="1" vertOverflow="ellipsis" vert="horz" wrap="square" anchor="ctr" anchorCtr="1"/>
-        <a:lstStyle/>
-        <a:p>
-          <a:pPr>
-            <a:defRPr sz="2400" b="0" i="0" u="none" strike="noStrike" kern="1200" baseline="0">
-              <a:solidFill>
-                <a:schemeClr val="dk1">
-                  <a:lumMod val="65000"/>
-                  <a:lumOff val="35000"/>
-                </a:schemeClr>
-              </a:solidFill>
-              <a:latin typeface="+mn-lt"/>
-              <a:ea typeface="+mn-ea"/>
-              <a:cs typeface="+mn-cs"/>
-            </a:defRPr>
-          </a:pPr>
-          <a:endParaRPr lang="es-MX"/>
-        </a:p>
-      </c:txPr>
-    </c:legend>
     <c:plotVisOnly val="1"/>
     <c:dispBlanksAs val="gap"/>
     <c:showDLblsOverMax val="0"/>
   </c:chart>
   <c:spPr>
     <a:noFill/>
-    <a:ln w="9525" cap="flat" cmpd="sng" algn="ctr">
+    <a:ln>
       <a:noFill/>
-      <a:round/>
     </a:ln>
     <a:effectLst/>
   </c:spPr>
@@ -728,53 +589,33 @@
 </file>
 
 <file path=ppt/charts/style1.xml><?xml version="1.0" encoding="utf-8"?>
-<cs:chartStyle xmlns:cs="http://schemas.microsoft.com/office/drawing/2012/chartStyle" xmlns:a="http://schemas.openxmlformats.org/drawingml/2006/main" id="256">
+<cs:chartStyle xmlns:cs="http://schemas.microsoft.com/office/drawing/2012/chartStyle" xmlns:a="http://schemas.openxmlformats.org/drawingml/2006/main" id="201">
   <cs:axisTitle>
     <cs:lnRef idx="0"/>
     <cs:fillRef idx="0"/>
     <cs:effectRef idx="0"/>
     <cs:fontRef idx="minor">
-      <a:schemeClr val="dk1">
+      <a:schemeClr val="tx1">
         <a:lumMod val="65000"/>
         <a:lumOff val="35000"/>
       </a:schemeClr>
     </cs:fontRef>
-    <cs:defRPr sz="900" b="1" kern="1200"/>
+    <cs:defRPr sz="1330" kern="1200"/>
   </cs:axisTitle>
   <cs:categoryAxis>
     <cs:lnRef idx="0"/>
     <cs:fillRef idx="0"/>
     <cs:effectRef idx="0"/>
     <cs:fontRef idx="minor">
-      <a:schemeClr val="dk1">
+      <a:schemeClr val="tx1">
         <a:lumMod val="65000"/>
         <a:lumOff val="35000"/>
       </a:schemeClr>
     </cs:fontRef>
-    <cs:defRPr sz="900" kern="1200" cap="none" spc="0" normalizeH="0" baseline="0"/>
-  </cs:categoryAxis>
-  <cs:chartArea>
-    <cs:lnRef idx="0"/>
-    <cs:fillRef idx="0"/>
-    <cs:effectRef idx="0"/>
-    <cs:fontRef idx="minor">
-      <a:schemeClr val="dk1"/>
-    </cs:fontRef>
     <cs:spPr>
-      <a:pattFill prst="dkDnDiag">
-        <a:fgClr>
-          <a:schemeClr val="lt1"/>
-        </a:fgClr>
-        <a:bgClr>
-          <a:schemeClr val="dk1">
-            <a:lumMod val="10000"/>
-            <a:lumOff val="90000"/>
-          </a:schemeClr>
-        </a:bgClr>
-      </a:pattFill>
       <a:ln w="9525" cap="flat" cmpd="sng" algn="ctr">
         <a:solidFill>
-          <a:schemeClr val="dk1">
+          <a:schemeClr val="tx1">
             <a:lumMod val="15000"/>
             <a:lumOff val="85000"/>
           </a:schemeClr>
@@ -782,19 +623,42 @@
         <a:round/>
       </a:ln>
     </cs:spPr>
-    <cs:defRPr sz="900" kern="1200"/>
+    <cs:defRPr sz="1197" kern="1200"/>
+  </cs:categoryAxis>
+  <cs:chartArea mods="allowNoFillOverride allowNoLineOverride">
+    <cs:lnRef idx="0"/>
+    <cs:fillRef idx="0"/>
+    <cs:effectRef idx="0"/>
+    <cs:fontRef idx="minor">
+      <a:schemeClr val="tx1"/>
+    </cs:fontRef>
+    <cs:spPr>
+      <a:solidFill>
+        <a:schemeClr val="bg1"/>
+      </a:solidFill>
+      <a:ln w="9525" cap="flat" cmpd="sng" algn="ctr">
+        <a:solidFill>
+          <a:schemeClr val="tx1">
+            <a:lumMod val="15000"/>
+            <a:lumOff val="85000"/>
+          </a:schemeClr>
+        </a:solidFill>
+        <a:round/>
+      </a:ln>
+    </cs:spPr>
+    <cs:defRPr sz="1330" kern="1200"/>
   </cs:chartArea>
   <cs:dataLabel>
     <cs:lnRef idx="0"/>
     <cs:fillRef idx="0"/>
     <cs:effectRef idx="0"/>
     <cs:fontRef idx="minor">
-      <a:schemeClr val="dk1">
+      <a:schemeClr val="tx1">
         <a:lumMod val="75000"/>
         <a:lumOff val="25000"/>
       </a:schemeClr>
     </cs:fontRef>
-    <cs:defRPr sz="900" kern="1200"/>
+    <cs:defRPr sz="1197" kern="1200"/>
   </cs:dataLabel>
   <cs:dataLabelCallout>
     <cs:lnRef idx="0"/>
@@ -808,11 +672,9 @@
     </cs:fontRef>
     <cs:spPr>
       <a:solidFill>
-        <a:schemeClr val="lt1">
-          <a:alpha val="75000"/>
-        </a:schemeClr>
+        <a:schemeClr val="lt1"/>
       </a:solidFill>
-      <a:ln w="9525">
+      <a:ln>
         <a:solidFill>
           <a:schemeClr val="dk1">
             <a:lumMod val="25000"/>
@@ -821,84 +683,42 @@
         </a:solidFill>
       </a:ln>
     </cs:spPr>
-    <cs:defRPr sz="900" kern="1200"/>
+    <cs:defRPr sz="1197" kern="1200"/>
     <cs:bodyPr rot="0" spcFirstLastPara="1" vertOverflow="clip" horzOverflow="clip" vert="horz" wrap="square" lIns="36576" tIns="18288" rIns="36576" bIns="18288" anchor="ctr" anchorCtr="1">
       <a:spAutoFit/>
     </cs:bodyPr>
   </cs:dataLabelCallout>
   <cs:dataPoint>
     <cs:lnRef idx="0"/>
-    <cs:fillRef idx="0">
+    <cs:fillRef idx="1">
       <cs:styleClr val="auto"/>
     </cs:fillRef>
     <cs:effectRef idx="0"/>
     <cs:fontRef idx="minor">
       <a:schemeClr val="tx1"/>
     </cs:fontRef>
-    <cs:spPr>
-      <a:gradFill>
-        <a:gsLst>
-          <a:gs pos="100000">
-            <a:schemeClr val="phClr">
-              <a:lumMod val="60000"/>
-              <a:lumOff val="40000"/>
-            </a:schemeClr>
-          </a:gs>
-          <a:gs pos="0">
-            <a:schemeClr val="phClr"/>
-          </a:gs>
-        </a:gsLst>
-        <a:lin ang="5400000" scaled="0"/>
-      </a:gradFill>
-      <a:ln w="19050">
-        <a:solidFill>
-          <a:schemeClr val="lt1"/>
-        </a:solidFill>
-      </a:ln>
-    </cs:spPr>
   </cs:dataPoint>
   <cs:dataPoint3D>
     <cs:lnRef idx="0"/>
-    <cs:fillRef idx="0">
+    <cs:fillRef idx="1">
       <cs:styleClr val="auto"/>
     </cs:fillRef>
     <cs:effectRef idx="0"/>
     <cs:fontRef idx="minor">
       <a:schemeClr val="tx1"/>
     </cs:fontRef>
-    <cs:spPr>
-      <a:gradFill>
-        <a:gsLst>
-          <a:gs pos="100000">
-            <a:schemeClr val="phClr">
-              <a:lumMod val="60000"/>
-              <a:lumOff val="40000"/>
-            </a:schemeClr>
-          </a:gs>
-          <a:gs pos="0">
-            <a:schemeClr val="phClr"/>
-          </a:gs>
-        </a:gsLst>
-        <a:lin ang="5400000" scaled="0"/>
-      </a:gradFill>
-      <a:ln w="50800">
-        <a:solidFill>
-          <a:schemeClr val="lt1"/>
-        </a:solidFill>
-      </a:ln>
-    </cs:spPr>
   </cs:dataPoint3D>
   <cs:dataPointLine>
     <cs:lnRef idx="0">
       <cs:styleClr val="auto"/>
     </cs:lnRef>
-    <cs:fillRef idx="0"/>
+    <cs:fillRef idx="1"/>
     <cs:effectRef idx="0"/>
     <cs:fontRef idx="minor">
-      <a:schemeClr val="dk1"/>
+      <a:schemeClr val="tx1"/>
     </cs:fontRef>
     <cs:spPr>
-      <a:ln w="22225" cap="rnd">
+      <a:ln w="28575" cap="rnd">
         <a:solidFill>
           <a:schemeClr val="phClr"/>
         </a:solidFill>
@@ -910,34 +730,30 @@
     <cs:lnRef idx="0">
       <cs:styleClr val="auto"/>
     </cs:lnRef>
-    <cs:fillRef idx="0">
+    <cs:fillRef idx="1">
       <cs:styleClr val="auto"/>
     </cs:fillRef>
     <cs:effectRef idx="0"/>
     <cs:fontRef idx="minor">
-      <a:schemeClr val="dk1"/>
+      <a:schemeClr val="tx1"/>
     </cs:fontRef>
     <cs:spPr>
-      <a:solidFill>
-        <a:schemeClr val="lt1"/>
-      </a:solidFill>
-      <a:ln w="15875">
+      <a:ln w="9525">
         <a:solidFill>
           <a:schemeClr val="phClr"/>
         </a:solidFill>
-        <a:round/>
       </a:ln>
     </cs:spPr>
   </cs:dataPointMarker>
-  <cs:dataPointMarkerLayout symbol="circle" size="6"/>
+  <cs:dataPointMarkerLayout symbol="circle" size="5"/>
   <cs:dataPointWireframe>
     <cs:lnRef idx="0">
       <cs:styleClr val="auto"/>
     </cs:lnRef>
-    <cs:fillRef idx="0"/>
+    <cs:fillRef idx="1"/>
     <cs:effectRef idx="0"/>
     <cs:fontRef idx="minor">
-      <a:schemeClr val="dk1"/>
+      <a:schemeClr val="tx1"/>
     </cs:fontRef>
     <cs:spPr>
       <a:ln w="9525" cap="rnd">
@@ -953,15 +769,16 @@
     <cs:fillRef idx="0"/>
     <cs:effectRef idx="0"/>
     <cs:fontRef idx="minor">
-      <a:schemeClr val="dk1">
+      <a:schemeClr val="tx1">
         <a:lumMod val="65000"/>
         <a:lumOff val="35000"/>
       </a:schemeClr>
     </cs:fontRef>
     <cs:spPr>
+      <a:noFill/>
       <a:ln w="9525" cap="flat" cmpd="sng" algn="ctr">
         <a:solidFill>
-          <a:schemeClr val="dk1">
+          <a:schemeClr val="tx1">
             <a:lumMod val="15000"/>
             <a:lumOff val="85000"/>
           </a:schemeClr>
@@ -969,7 +786,7 @@
         <a:round/>
       </a:ln>
     </cs:spPr>
-    <cs:defRPr sz="800" kern="1200"/>
+    <cs:defRPr sz="1197" kern="1200"/>
   </cs:dataTable>
   <cs:downBar>
     <cs:lnRef idx="0"/>
@@ -981,18 +798,17 @@
     <cs:spPr>
       <a:solidFill>
         <a:schemeClr val="dk1">
-          <a:lumMod val="75000"/>
-          <a:lumOff val="25000"/>
+          <a:lumMod val="65000"/>
+          <a:lumOff val="35000"/>
         </a:schemeClr>
       </a:solidFill>
-      <a:ln w="9525" cap="flat" cmpd="sng" algn="ctr">
+      <a:ln w="9525">
         <a:solidFill>
-          <a:schemeClr val="dk1">
-            <a:lumMod val="50000"/>
-            <a:lumOff val="50000"/>
+          <a:schemeClr val="tx1">
+            <a:lumMod val="65000"/>
+            <a:lumOff val="35000"/>
           </a:schemeClr>
         </a:solidFill>
-        <a:round/>
       </a:ln>
     </cs:spPr>
   </cs:downBar>
@@ -1001,12 +817,12 @@
     <cs:fillRef idx="0"/>
     <cs:effectRef idx="0"/>
     <cs:fontRef idx="minor">
-      <a:schemeClr val="dk1"/>
+      <a:schemeClr val="tx1"/>
     </cs:fontRef>
     <cs:spPr>
       <a:ln w="9525" cap="flat" cmpd="sng" algn="ctr">
         <a:solidFill>
-          <a:schemeClr val="dk1">
+          <a:schemeClr val="tx1">
             <a:lumMod val="35000"/>
             <a:lumOff val="65000"/>
           </a:schemeClr>
@@ -1020,14 +836,14 @@
     <cs:fillRef idx="0"/>
     <cs:effectRef idx="0"/>
     <cs:fontRef idx="minor">
-      <a:schemeClr val="dk1"/>
+      <a:schemeClr val="tx1"/>
     </cs:fontRef>
     <cs:spPr>
       <a:ln w="9525" cap="flat" cmpd="sng" algn="ctr">
         <a:solidFill>
-          <a:schemeClr val="dk1">
-            <a:lumMod val="50000"/>
-            <a:lumOff val="50000"/>
+          <a:schemeClr val="tx1">
+            <a:lumMod val="65000"/>
+            <a:lumOff val="35000"/>
           </a:schemeClr>
         </a:solidFill>
         <a:round/>
@@ -1039,20 +855,26 @@
     <cs:fillRef idx="0"/>
     <cs:effectRef idx="0"/>
     <cs:fontRef idx="minor">
-      <a:schemeClr val="dk1"/>
+      <a:schemeClr val="tx1"/>
     </cs:fontRef>
+    <cs:spPr>
+      <a:noFill/>
+      <a:ln>
+        <a:noFill/>
+      </a:ln>
+    </cs:spPr>
   </cs:floor>
   <cs:gridlineMajor>
     <cs:lnRef idx="0"/>
     <cs:fillRef idx="0"/>
     <cs:effectRef idx="0"/>
     <cs:fontRef idx="minor">
-      <a:schemeClr val="dk1"/>
+      <a:schemeClr val="tx1"/>
     </cs:fontRef>
     <cs:spPr>
       <a:ln w="9525" cap="flat" cmpd="sng" algn="ctr">
         <a:solidFill>
-          <a:schemeClr val="dk1">
+          <a:schemeClr val="tx1">
             <a:lumMod val="15000"/>
             <a:lumOff val="85000"/>
           </a:schemeClr>
@@ -1066,12 +888,12 @@
     <cs:fillRef idx="0"/>
     <cs:effectRef idx="0"/>
     <cs:fontRef idx="minor">
-      <a:schemeClr val="dk1"/>
+      <a:schemeClr val="tx1"/>
     </cs:fontRef>
     <cs:spPr>
       <a:ln w="9525" cap="flat" cmpd="sng" algn="ctr">
         <a:solidFill>
-          <a:schemeClr val="dk1">
+          <a:schemeClr val="tx1">
             <a:lumMod val="5000"/>
             <a:lumOff val="95000"/>
           </a:schemeClr>
@@ -1085,14 +907,14 @@
     <cs:fillRef idx="0"/>
     <cs:effectRef idx="0"/>
     <cs:fontRef idx="minor">
-      <a:schemeClr val="dk1"/>
+      <a:schemeClr val="tx1"/>
     </cs:fontRef>
     <cs:spPr>
       <a:ln w="9525" cap="flat" cmpd="sng" algn="ctr">
         <a:solidFill>
-          <a:schemeClr val="dk1">
-            <a:lumMod val="35000"/>
-            <a:lumOff val="65000"/>
+          <a:schemeClr val="tx1">
+            <a:lumMod val="75000"/>
+            <a:lumOff val="25000"/>
           </a:schemeClr>
         </a:solidFill>
         <a:round/>
@@ -1104,12 +926,12 @@
     <cs:fillRef idx="0"/>
     <cs:effectRef idx="0"/>
     <cs:fontRef idx="minor">
-      <a:schemeClr val="dk1"/>
+      <a:schemeClr val="tx1"/>
     </cs:fontRef>
     <cs:spPr>
       <a:ln w="9525" cap="flat" cmpd="sng" algn="ctr">
         <a:solidFill>
-          <a:schemeClr val="dk1">
+          <a:schemeClr val="tx1">
             <a:lumMod val="35000"/>
             <a:lumOff val="65000"/>
           </a:schemeClr>
@@ -1123,34 +945,27 @@
     <cs:fillRef idx="0"/>
     <cs:effectRef idx="0"/>
     <cs:fontRef idx="minor">
-      <a:schemeClr val="dk1">
+      <a:schemeClr val="tx1">
         <a:lumMod val="65000"/>
         <a:lumOff val="35000"/>
       </a:schemeClr>
     </cs:fontRef>
-    <cs:spPr>
-      <a:solidFill>
-        <a:schemeClr val="lt1">
-          <a:alpha val="50000"/>
-        </a:schemeClr>
-      </a:solidFill>
-    </cs:spPr>
-    <cs:defRPr sz="900" kern="1200"/>
+    <cs:defRPr sz="1197" kern="1200"/>
   </cs:legend>
-  <cs:plotArea>
+  <cs:plotArea mods="allowNoFillOverride allowNoLineOverride">
     <cs:lnRef idx="0"/>
     <cs:fillRef idx="0"/>
     <cs:effectRef idx="0"/>
     <cs:fontRef idx="minor">
-      <a:schemeClr val="dk1"/>
+      <a:schemeClr val="tx1"/>
     </cs:fontRef>
   </cs:plotArea>
-  <cs:plotArea3D>
+  <cs:plotArea3D mods="allowNoFillOverride allowNoLineOverride">
     <cs:lnRef idx="0"/>
     <cs:fillRef idx="0"/>
     <cs:effectRef idx="0"/>
     <cs:fontRef idx="minor">
-      <a:schemeClr val="dk1"/>
+      <a:schemeClr val="tx1"/>
     </cs:fontRef>
   </cs:plotArea3D>
   <cs:seriesAxis>
@@ -1158,24 +973,24 @@
     <cs:fillRef idx="0"/>
     <cs:effectRef idx="0"/>
     <cs:fontRef idx="minor">
-      <a:schemeClr val="dk1">
+      <a:schemeClr val="tx1">
         <a:lumMod val="65000"/>
         <a:lumOff val="35000"/>
       </a:schemeClr>
     </cs:fontRef>
-    <cs:defRPr sz="900" kern="1200"/>
+    <cs:defRPr sz="1197" kern="1200"/>
   </cs:seriesAxis>
   <cs:seriesLine>
     <cs:lnRef idx="0"/>
     <cs:fillRef idx="0"/>
     <cs:effectRef idx="0"/>
     <cs:fontRef idx="minor">
-      <a:schemeClr val="dk1"/>
+      <a:schemeClr val="tx1"/>
     </cs:fontRef>
     <cs:spPr>
       <a:ln w="9525" cap="flat" cmpd="sng" algn="ctr">
         <a:solidFill>
-          <a:schemeClr val="dk1">
+          <a:schemeClr val="tx1">
             <a:lumMod val="35000"/>
             <a:lumOff val="65000"/>
           </a:schemeClr>
@@ -1188,13 +1003,13 @@
     <cs:lnRef idx="0"/>
     <cs:fillRef idx="0"/>
     <cs:effectRef idx="0"/>
-    <cs:fontRef idx="major">
-      <a:schemeClr val="dk1">
-        <a:lumMod val="50000"/>
-        <a:lumOff val="50000"/>
+    <cs:fontRef idx="minor">
+      <a:schemeClr val="tx1">
+        <a:lumMod val="65000"/>
+        <a:lumOff val="35000"/>
       </a:schemeClr>
     </cs:fontRef>
-    <cs:defRPr sz="1600" b="1" kern="1200" spc="0" normalizeH="0" baseline="0"/>
+    <cs:defRPr sz="1862" b="0" kern="1200" spc="0" baseline="0"/>
   </cs:title>
   <cs:trendline>
     <cs:lnRef idx="0">
@@ -1203,13 +1018,14 @@
     <cs:fillRef idx="0"/>
     <cs:effectRef idx="0"/>
     <cs:fontRef idx="minor">
-      <a:schemeClr val="dk1"/>
+      <a:schemeClr val="tx1"/>
     </cs:fontRef>
     <cs:spPr>
       <a:ln w="19050" cap="rnd">
         <a:solidFill>
           <a:schemeClr val="phClr"/>
         </a:solidFill>
+        <a:prstDash val="sysDot"/>
       </a:ln>
     </cs:spPr>
   </cs:trendline>
@@ -1218,12 +1034,12 @@
     <cs:fillRef idx="0"/>
     <cs:effectRef idx="0"/>
     <cs:fontRef idx="minor">
-      <a:schemeClr val="dk1">
+      <a:schemeClr val="tx1">
         <a:lumMod val="65000"/>
         <a:lumOff val="35000"/>
       </a:schemeClr>
     </cs:fontRef>
-    <cs:defRPr sz="900" kern="1200"/>
+    <cs:defRPr sz="1197" kern="1200"/>
   </cs:trendlineLabel>
   <cs:upBar>
     <cs:lnRef idx="0"/>
@@ -1236,14 +1052,13 @@
       <a:solidFill>
         <a:schemeClr val="lt1"/>
       </a:solidFill>
-      <a:ln w="9525" cap="flat" cmpd="sng" algn="ctr">
+      <a:ln w="9525">
         <a:solidFill>
-          <a:schemeClr val="dk1">
-            <a:lumMod val="50000"/>
-            <a:lumOff val="50000"/>
+          <a:schemeClr val="tx1">
+            <a:lumMod val="15000"/>
+            <a:lumOff val="85000"/>
           </a:schemeClr>
         </a:solidFill>
-        <a:round/>
       </a:ln>
     </cs:spPr>
   </cs:upBar>
@@ -1252,20 +1067,26 @@
     <cs:fillRef idx="0"/>
     <cs:effectRef idx="0"/>
     <cs:fontRef idx="minor">
-      <a:schemeClr val="dk1">
+      <a:schemeClr val="tx1">
         <a:lumMod val="65000"/>
         <a:lumOff val="35000"/>
       </a:schemeClr>
     </cs:fontRef>
-    <cs:defRPr sz="900" kern="1200"/>
+    <cs:defRPr sz="1197" kern="1200"/>
   </cs:valueAxis>
   <cs:wall>
     <cs:lnRef idx="0"/>
     <cs:fillRef idx="0"/>
     <cs:effectRef idx="0"/>
     <cs:fontRef idx="minor">
-      <a:schemeClr val="dk1"/>
+      <a:schemeClr val="tx1"/>
     </cs:fontRef>
+    <cs:spPr>
+      <a:noFill/>
+      <a:ln>
+        <a:noFill/>
+      </a:ln>
+    </cs:spPr>
   </cs:wall>
 </cs:chartStyle>
 </file>
@@ -2974,15 +2795,15 @@
 </file>
 
 <file path=ppt/diagrams/colors3.xml><?xml version="1.0" encoding="utf-8"?>
-<dgm:colorsDef xmlns:dgm="http://schemas.openxmlformats.org/drawingml/2006/diagram" xmlns:a="http://schemas.openxmlformats.org/drawingml/2006/main" uniqueId="urn:microsoft.com/office/officeart/2005/8/colors/accent5_2">
+<dgm:colorsDef xmlns:dgm="http://schemas.openxmlformats.org/drawingml/2006/diagram" xmlns:a="http://schemas.openxmlformats.org/drawingml/2006/main" uniqueId="urn:microsoft.com/office/officeart/2005/8/colors/accent2_2">
   <dgm:title val=""/>
   <dgm:desc val=""/>
   <dgm:catLst>
-    <dgm:cat type="accent5" pri="11200"/>
+    <dgm:cat type="accent2" pri="11200"/>
   </dgm:catLst>
   <dgm:styleLbl name="node0">
     <dgm:fillClrLst meth="repeat">
-      <a:schemeClr val="accent5"/>
+      <a:schemeClr val="accent2"/>
     </dgm:fillClrLst>
     <dgm:linClrLst meth="repeat">
       <a:schemeClr val="lt1"/>
@@ -2994,7 +2815,7 @@
   </dgm:styleLbl>
   <dgm:styleLbl name="node1">
     <dgm:fillClrLst meth="repeat">
-      <a:schemeClr val="accent5"/>
+      <a:schemeClr val="accent2"/>
     </dgm:fillClrLst>
     <dgm:linClrLst meth="repeat">
       <a:schemeClr val="lt1"/>
@@ -3006,10 +2827,10 @@
   </dgm:styleLbl>
   <dgm:styleLbl name="alignNode1">
     <dgm:fillClrLst meth="repeat">
-      <a:schemeClr val="accent5"/>
+      <a:schemeClr val="accent2"/>
     </dgm:fillClrLst>
     <dgm:linClrLst meth="repeat">
-      <a:schemeClr val="accent5"/>
+      <a:schemeClr val="accent2"/>
     </dgm:linClrLst>
     <dgm:effectClrLst/>
     <dgm:txLinClrLst/>
@@ -3018,7 +2839,7 @@
   </dgm:styleLbl>
   <dgm:styleLbl name="lnNode1">
     <dgm:fillClrLst meth="repeat">
-      <a:schemeClr val="accent5"/>
+      <a:schemeClr val="accent2"/>
     </dgm:fillClrLst>
     <dgm:linClrLst meth="repeat">
       <a:schemeClr val="lt1"/>
@@ -3030,7 +2851,7 @@
   </dgm:styleLbl>
   <dgm:styleLbl name="vennNode1">
     <dgm:fillClrLst meth="repeat">
-      <a:schemeClr val="accent5">
+      <a:schemeClr val="accent2">
         <a:alpha val="50000"/>
       </a:schemeClr>
     </dgm:fillClrLst>
@@ -3044,7 +2865,7 @@
   </dgm:styleLbl>
   <dgm:styleLbl name="node2">
     <dgm:fillClrLst meth="repeat">
-      <a:schemeClr val="accent5"/>
+      <a:schemeClr val="accent2"/>
     </dgm:fillClrLst>
     <dgm:linClrLst meth="repeat">
       <a:schemeClr val="lt1"/>
@@ -3056,7 +2877,7 @@
   </dgm:styleLbl>
   <dgm:styleLbl name="node3">
     <dgm:fillClrLst meth="repeat">
-      <a:schemeClr val="accent5"/>
+      <a:schemeClr val="accent2"/>
     </dgm:fillClrLst>
     <dgm:linClrLst meth="repeat">
       <a:schemeClr val="lt1"/>
@@ -3068,7 +2889,7 @@
   </dgm:styleLbl>
   <dgm:styleLbl name="node4">
     <dgm:fillClrLst meth="repeat">
-      <a:schemeClr val="accent5"/>
+      <a:schemeClr val="accent2"/>
     </dgm:fillClrLst>
     <dgm:linClrLst meth="repeat">
       <a:schemeClr val="lt1"/>
@@ -3080,7 +2901,7 @@
   </dgm:styleLbl>
   <dgm:styleLbl name="fgImgPlace1">
     <dgm:fillClrLst meth="repeat">
-      <a:schemeClr val="accent5">
+      <a:schemeClr val="accent2">
         <a:tint val="50000"/>
       </a:schemeClr>
     </dgm:fillClrLst>
@@ -3096,7 +2917,7 @@
   </dgm:styleLbl>
   <dgm:styleLbl name="alignImgPlace1">
     <dgm:fillClrLst meth="repeat">
-      <a:schemeClr val="accent5">
+      <a:schemeClr val="accent2">
         <a:tint val="50000"/>
       </a:schemeClr>
     </dgm:fillClrLst>
@@ -3112,7 +2933,7 @@
   </dgm:styleLbl>
   <dgm:styleLbl name="bgImgPlace1">
     <dgm:fillClrLst meth="repeat">
-      <a:schemeClr val="accent5">
+      <a:schemeClr val="accent2">
         <a:tint val="50000"/>
       </a:schemeClr>
     </dgm:fillClrLst>
@@ -3128,12 +2949,12 @@
   </dgm:styleLbl>
   <dgm:styleLbl name="sibTrans2D1">
     <dgm:fillClrLst meth="repeat">
-      <a:schemeClr val="accent5">
+      <a:schemeClr val="accent2">
         <a:tint val="60000"/>
       </a:schemeClr>
     </dgm:fillClrLst>
     <dgm:linClrLst meth="repeat">
-      <a:schemeClr val="accent5">
+      <a:schemeClr val="accent2">
         <a:tint val="60000"/>
       </a:schemeClr>
     </dgm:linClrLst>
@@ -3144,12 +2965,12 @@
   </dgm:styleLbl>
   <dgm:styleLbl name="fgSibTrans2D1">
     <dgm:fillClrLst meth="repeat">
-      <a:schemeClr val="accent5">
+      <a:schemeClr val="accent2">
         <a:tint val="60000"/>
       </a:schemeClr>
     </dgm:fillClrLst>
     <dgm:linClrLst meth="repeat">
-      <a:schemeClr val="accent5">
+      <a:schemeClr val="accent2">
         <a:tint val="60000"/>
       </a:schemeClr>
     </dgm:linClrLst>
@@ -3160,12 +2981,12 @@
   </dgm:styleLbl>
   <dgm:styleLbl name="bgSibTrans2D1">
     <dgm:fillClrLst meth="repeat">
-      <a:schemeClr val="accent5">
+      <a:schemeClr val="accent2">
         <a:tint val="60000"/>
       </a:schemeClr>
     </dgm:fillClrLst>
     <dgm:linClrLst meth="repeat">
-      <a:schemeClr val="accent5">
+      <a:schemeClr val="accent2">
         <a:tint val="60000"/>
       </a:schemeClr>
     </dgm:linClrLst>
@@ -3176,10 +2997,10 @@
   </dgm:styleLbl>
   <dgm:styleLbl name="sibTrans1D1">
     <dgm:fillClrLst meth="repeat">
-      <a:schemeClr val="accent5"/>
+      <a:schemeClr val="accent2"/>
     </dgm:fillClrLst>
     <dgm:linClrLst meth="repeat">
-      <a:schemeClr val="accent5"/>
+      <a:schemeClr val="accent2"/>
     </dgm:linClrLst>
     <dgm:effectClrLst/>
     <dgm:txLinClrLst/>
@@ -3190,10 +3011,10 @@
   </dgm:styleLbl>
   <dgm:styleLbl name="callout">
     <dgm:fillClrLst meth="repeat">
-      <a:schemeClr val="accent5"/>
+      <a:schemeClr val="accent2"/>
     </dgm:fillClrLst>
     <dgm:linClrLst meth="repeat">
-      <a:schemeClr val="accent5">
+      <a:schemeClr val="accent2">
         <a:tint val="50000"/>
       </a:schemeClr>
     </dgm:linClrLst>
@@ -3206,7 +3027,7 @@
   </dgm:styleLbl>
   <dgm:styleLbl name="asst0">
     <dgm:fillClrLst meth="repeat">
-      <a:schemeClr val="accent5"/>
+      <a:schemeClr val="accent2"/>
     </dgm:fillClrLst>
     <dgm:linClrLst meth="repeat">
       <a:schemeClr val="lt1"/>
@@ -3218,7 +3039,7 @@
   </dgm:styleLbl>
   <dgm:styleLbl name="asst1">
     <dgm:fillClrLst meth="repeat">
-      <a:schemeClr val="accent5"/>
+      <a:schemeClr val="accent2"/>
     </dgm:fillClrLst>
     <dgm:linClrLst meth="repeat">
       <a:schemeClr val="lt1"/>
@@ -3230,7 +3051,7 @@
   </dgm:styleLbl>
   <dgm:styleLbl name="asst2">
     <dgm:fillClrLst meth="repeat">
-      <a:schemeClr val="accent5"/>
+      <a:schemeClr val="accent2"/>
     </dgm:fillClrLst>
     <dgm:linClrLst meth="repeat">
       <a:schemeClr val="lt1"/>
@@ -3242,7 +3063,7 @@
   </dgm:styleLbl>
   <dgm:styleLbl name="asst3">
     <dgm:fillClrLst meth="repeat">
-      <a:schemeClr val="accent5"/>
+      <a:schemeClr val="accent2"/>
     </dgm:fillClrLst>
     <dgm:linClrLst meth="repeat">
       <a:schemeClr val="lt1"/>
@@ -3254,7 +3075,7 @@
   </dgm:styleLbl>
   <dgm:styleLbl name="asst4">
     <dgm:fillClrLst meth="repeat">
-      <a:schemeClr val="accent5"/>
+      <a:schemeClr val="accent2"/>
     </dgm:fillClrLst>
     <dgm:linClrLst meth="repeat">
       <a:schemeClr val="lt1"/>
@@ -3266,12 +3087,12 @@
   </dgm:styleLbl>
   <dgm:styleLbl name="parChTrans2D1">
     <dgm:fillClrLst meth="repeat">
-      <a:schemeClr val="accent5">
+      <a:schemeClr val="accent2">
         <a:tint val="60000"/>
       </a:schemeClr>
     </dgm:fillClrLst>
     <dgm:linClrLst meth="repeat">
-      <a:schemeClr val="accent5">
+      <a:schemeClr val="accent2">
         <a:tint val="60000"/>
       </a:schemeClr>
     </dgm:linClrLst>
@@ -3284,10 +3105,10 @@
   </dgm:styleLbl>
   <dgm:styleLbl name="parChTrans2D2">
     <dgm:fillClrLst meth="repeat">
-      <a:schemeClr val="accent5"/>
+      <a:schemeClr val="accent2"/>
     </dgm:fillClrLst>
     <dgm:linClrLst meth="repeat">
-      <a:schemeClr val="accent5"/>
+      <a:schemeClr val="accent2"/>
     </dgm:linClrLst>
     <dgm:effectClrLst/>
     <dgm:txLinClrLst/>
@@ -3298,10 +3119,10 @@
   </dgm:styleLbl>
   <dgm:styleLbl name="parChTrans2D3">
     <dgm:fillClrLst meth="repeat">
-      <a:schemeClr val="accent5"/>
+      <a:schemeClr val="accent2"/>
     </dgm:fillClrLst>
     <dgm:linClrLst meth="repeat">
-      <a:schemeClr val="accent5"/>
+      <a:schemeClr val="accent2"/>
     </dgm:linClrLst>
     <dgm:effectClrLst/>
     <dgm:txLinClrLst/>
@@ -3312,10 +3133,10 @@
   </dgm:styleLbl>
   <dgm:styleLbl name="parChTrans2D4">
     <dgm:fillClrLst meth="repeat">
-      <a:schemeClr val="accent5"/>
+      <a:schemeClr val="accent2"/>
     </dgm:fillClrLst>
     <dgm:linClrLst meth="repeat">
-      <a:schemeClr val="accent5"/>
+      <a:schemeClr val="accent2"/>
     </dgm:linClrLst>
     <dgm:effectClrLst/>
     <dgm:txLinClrLst/>
@@ -3326,10 +3147,10 @@
   </dgm:styleLbl>
   <dgm:styleLbl name="parChTrans1D1">
     <dgm:fillClrLst meth="repeat">
-      <a:schemeClr val="accent5"/>
+      <a:schemeClr val="accent2"/>
     </dgm:fillClrLst>
     <dgm:linClrLst meth="repeat">
-      <a:schemeClr val="accent5">
+      <a:schemeClr val="accent2">
         <a:shade val="60000"/>
       </a:schemeClr>
     </dgm:linClrLst>
@@ -3342,10 +3163,10 @@
   </dgm:styleLbl>
   <dgm:styleLbl name="parChTrans1D2">
     <dgm:fillClrLst meth="repeat">
-      <a:schemeClr val="accent5"/>
+      <a:schemeClr val="accent2"/>
     </dgm:fillClrLst>
     <dgm:linClrLst meth="repeat">
-      <a:schemeClr val="accent5">
+      <a:schemeClr val="accent2">
         <a:shade val="60000"/>
       </a:schemeClr>
     </dgm:linClrLst>
@@ -3358,10 +3179,10 @@
   </dgm:styleLbl>
   <dgm:styleLbl name="parChTrans1D3">
     <dgm:fillClrLst meth="repeat">
-      <a:schemeClr val="accent5"/>
+      <a:schemeClr val="accent2"/>
     </dgm:fillClrLst>
     <dgm:linClrLst meth="repeat">
-      <a:schemeClr val="accent5">
+      <a:schemeClr val="accent2">
         <a:shade val="80000"/>
       </a:schemeClr>
     </dgm:linClrLst>
@@ -3374,10 +3195,10 @@
   </dgm:styleLbl>
   <dgm:styleLbl name="parChTrans1D4">
     <dgm:fillClrLst meth="repeat">
-      <a:schemeClr val="accent5"/>
+      <a:schemeClr val="accent2"/>
     </dgm:fillClrLst>
     <dgm:linClrLst meth="repeat">
-      <a:schemeClr val="accent5">
+      <a:schemeClr val="accent2">
         <a:shade val="80000"/>
       </a:schemeClr>
     </dgm:linClrLst>
@@ -3395,7 +3216,7 @@
       </a:schemeClr>
     </dgm:fillClrLst>
     <dgm:linClrLst meth="repeat">
-      <a:schemeClr val="accent5"/>
+      <a:schemeClr val="accent2"/>
     </dgm:linClrLst>
     <dgm:effectClrLst/>
     <dgm:txLinClrLst/>
@@ -3411,7 +3232,7 @@
       </a:schemeClr>
     </dgm:fillClrLst>
     <dgm:linClrLst meth="repeat">
-      <a:schemeClr val="accent5"/>
+      <a:schemeClr val="accent2"/>
     </dgm:linClrLst>
     <dgm:effectClrLst/>
     <dgm:txLinClrLst/>
@@ -3427,7 +3248,7 @@
       </a:schemeClr>
     </dgm:fillClrLst>
     <dgm:linClrLst meth="repeat">
-      <a:schemeClr val="accent5"/>
+      <a:schemeClr val="accent2"/>
     </dgm:linClrLst>
     <dgm:effectClrLst/>
     <dgm:txLinClrLst/>
@@ -3443,7 +3264,7 @@
       </a:schemeClr>
     </dgm:fillClrLst>
     <dgm:linClrLst meth="repeat">
-      <a:schemeClr val="accent5"/>
+      <a:schemeClr val="accent2"/>
     </dgm:linClrLst>
     <dgm:effectClrLst/>
     <dgm:txLinClrLst/>
@@ -3459,7 +3280,7 @@
       </a:schemeClr>
     </dgm:fillClrLst>
     <dgm:linClrLst meth="repeat">
-      <a:schemeClr val="accent5"/>
+      <a:schemeClr val="accent2"/>
     </dgm:linClrLst>
     <dgm:effectClrLst/>
     <dgm:txLinClrLst/>
@@ -3473,7 +3294,7 @@
       <a:schemeClr val="lt1"/>
     </dgm:fillClrLst>
     <dgm:linClrLst meth="repeat">
-      <a:schemeClr val="accent5"/>
+      <a:schemeClr val="accent2"/>
     </dgm:linClrLst>
     <dgm:effectClrLst/>
     <dgm:txLinClrLst/>
@@ -3487,7 +3308,7 @@
       <a:schemeClr val="lt1"/>
     </dgm:fillClrLst>
     <dgm:linClrLst meth="repeat">
-      <a:schemeClr val="accent5"/>
+      <a:schemeClr val="accent2"/>
     </dgm:linClrLst>
     <dgm:effectClrLst/>
     <dgm:txLinClrLst/>
@@ -3501,7 +3322,7 @@
       <a:schemeClr val="lt1"/>
     </dgm:fillClrLst>
     <dgm:linClrLst meth="repeat">
-      <a:schemeClr val="accent5"/>
+      <a:schemeClr val="accent2"/>
     </dgm:linClrLst>
     <dgm:effectClrLst/>
     <dgm:txLinClrLst/>
@@ -3512,13 +3333,13 @@
   </dgm:styleLbl>
   <dgm:styleLbl name="fgAccFollowNode1">
     <dgm:fillClrLst meth="repeat">
-      <a:schemeClr val="accent5">
+      <a:schemeClr val="accent2">
         <a:alpha val="90000"/>
         <a:tint val="40000"/>
       </a:schemeClr>
     </dgm:fillClrLst>
     <dgm:linClrLst meth="repeat">
-      <a:schemeClr val="accent5">
+      <a:schemeClr val="accent2">
         <a:alpha val="90000"/>
         <a:tint val="40000"/>
       </a:schemeClr>
@@ -3532,13 +3353,13 @@
   </dgm:styleLbl>
   <dgm:styleLbl name="alignAccFollowNode1">
     <dgm:fillClrLst meth="repeat">
-      <a:schemeClr val="accent5">
+      <a:schemeClr val="accent2">
         <a:alpha val="90000"/>
         <a:tint val="40000"/>
       </a:schemeClr>
     </dgm:fillClrLst>
     <dgm:linClrLst meth="repeat">
-      <a:schemeClr val="accent5">
+      <a:schemeClr val="accent2">
         <a:alpha val="90000"/>
         <a:tint val="40000"/>
       </a:schemeClr>
@@ -3552,13 +3373,13 @@
   </dgm:styleLbl>
   <dgm:styleLbl name="bgAccFollowNode1">
     <dgm:fillClrLst meth="repeat">
-      <a:schemeClr val="accent5">
+      <a:schemeClr val="accent2">
         <a:alpha val="90000"/>
         <a:tint val="40000"/>
       </a:schemeClr>
     </dgm:fillClrLst>
     <dgm:linClrLst meth="repeat">
-      <a:schemeClr val="accent5">
+      <a:schemeClr val="accent2">
         <a:alpha val="90000"/>
         <a:tint val="40000"/>
       </a:schemeClr>
@@ -3577,7 +3398,7 @@
       </a:schemeClr>
     </dgm:fillClrLst>
     <dgm:linClrLst meth="repeat">
-      <a:schemeClr val="accent5"/>
+      <a:schemeClr val="accent2"/>
     </dgm:linClrLst>
     <dgm:effectClrLst/>
     <dgm:txLinClrLst/>
@@ -3593,7 +3414,7 @@
       </a:schemeClr>
     </dgm:fillClrLst>
     <dgm:linClrLst meth="repeat">
-      <a:schemeClr val="accent5"/>
+      <a:schemeClr val="accent2"/>
     </dgm:linClrLst>
     <dgm:effectClrLst/>
     <dgm:txLinClrLst/>
@@ -3609,7 +3430,7 @@
       </a:schemeClr>
     </dgm:fillClrLst>
     <dgm:linClrLst meth="repeat">
-      <a:schemeClr val="accent5"/>
+      <a:schemeClr val="accent2"/>
     </dgm:linClrLst>
     <dgm:effectClrLst/>
     <dgm:txLinClrLst/>
@@ -3625,7 +3446,7 @@
       </a:schemeClr>
     </dgm:fillClrLst>
     <dgm:linClrLst meth="repeat">
-      <a:schemeClr val="accent5"/>
+      <a:schemeClr val="accent2"/>
     </dgm:linClrLst>
     <dgm:effectClrLst/>
     <dgm:txLinClrLst/>
@@ -3636,12 +3457,12 @@
   </dgm:styleLbl>
   <dgm:styleLbl name="bgShp">
     <dgm:fillClrLst meth="repeat">
-      <a:schemeClr val="accent5">
+      <a:schemeClr val="accent2">
         <a:tint val="40000"/>
       </a:schemeClr>
     </dgm:fillClrLst>
     <dgm:linClrLst meth="repeat">
-      <a:schemeClr val="accent5"/>
+      <a:schemeClr val="accent2"/>
     </dgm:linClrLst>
     <dgm:effectClrLst/>
     <dgm:txLinClrLst/>
@@ -3652,12 +3473,12 @@
   </dgm:styleLbl>
   <dgm:styleLbl name="dkBgShp">
     <dgm:fillClrLst meth="repeat">
-      <a:schemeClr val="accent5">
+      <a:schemeClr val="accent2">
         <a:shade val="80000"/>
       </a:schemeClr>
     </dgm:fillClrLst>
     <dgm:linClrLst meth="repeat">
-      <a:schemeClr val="accent5"/>
+      <a:schemeClr val="accent2"/>
     </dgm:linClrLst>
     <dgm:effectClrLst/>
     <dgm:txLinClrLst/>
@@ -3668,13 +3489,13 @@
   </dgm:styleLbl>
   <dgm:styleLbl name="trBgShp">
     <dgm:fillClrLst meth="repeat">
-      <a:schemeClr val="accent5">
+      <a:schemeClr val="accent2">
         <a:tint val="50000"/>
         <a:alpha val="40000"/>
       </a:schemeClr>
     </dgm:fillClrLst>
     <dgm:linClrLst meth="repeat">
-      <a:schemeClr val="accent5"/>
+      <a:schemeClr val="accent2"/>
     </dgm:linClrLst>
     <dgm:effectClrLst/>
     <dgm:txLinClrLst/>
@@ -3685,7 +3506,7 @@
   </dgm:styleLbl>
   <dgm:styleLbl name="fgShp">
     <dgm:fillClrLst meth="repeat">
-      <a:schemeClr val="accent5">
+      <a:schemeClr val="accent2">
         <a:tint val="60000"/>
       </a:schemeClr>
     </dgm:fillClrLst>
@@ -8005,7 +7826,7 @@
 <dgm:dataModel xmlns:dgm="http://schemas.openxmlformats.org/drawingml/2006/diagram" xmlns:a="http://schemas.openxmlformats.org/drawingml/2006/main">
   <dgm:ptLst>
     <dgm:pt modelId="{53E94030-64DC-A543-8013-8674BAF21EC6}" type="doc">
-      <dgm:prSet loTypeId="urn:microsoft.com/office/officeart/2005/8/layout/hChevron3" loCatId="" qsTypeId="urn:microsoft.com/office/officeart/2005/8/quickstyle/simple1" qsCatId="simple" csTypeId="urn:microsoft.com/office/officeart/2005/8/colors/accent5_2" csCatId="accent5" phldr="1"/>
+      <dgm:prSet loTypeId="urn:microsoft.com/office/officeart/2005/8/layout/hChevron3" loCatId="" qsTypeId="urn:microsoft.com/office/officeart/2005/8/quickstyle/simple1" qsCatId="simple" csTypeId="urn:microsoft.com/office/officeart/2005/8/colors/accent2_2" csCatId="accent2" phldr="1"/>
       <dgm:spPr/>
     </dgm:pt>
     <dgm:pt modelId="{043D3C1D-4CFC-8C48-8003-E6DA76EE25ED}">
@@ -8026,11 +7847,7 @@
             <a:t>(</a:t>
           </a:r>
           <a:r>
-            <a:rPr lang="es-MX" i="1">
-              <a:solidFill>
-                <a:srgbClr val="FFFF00"/>
-              </a:solidFill>
-            </a:rPr>
+            <a:rPr lang="es-MX" i="1"/>
             <a:t>raw data</a:t>
           </a:r>
           <a:r>
@@ -8080,11 +7897,7 @@
             <a:t>(</a:t>
           </a:r>
           <a:r>
-            <a:rPr lang="es-MX" i="1">
-              <a:solidFill>
-                <a:srgbClr val="FFFF00"/>
-              </a:solidFill>
-            </a:rPr>
+            <a:rPr lang="es-MX" i="1"/>
             <a:t>data wrangling</a:t>
           </a:r>
           <a:r>
@@ -8134,11 +7947,7 @@
             <a:t>(</a:t>
           </a:r>
           <a:r>
-            <a:rPr lang="es-MX" i="1">
-              <a:solidFill>
-                <a:srgbClr val="FFFF00"/>
-              </a:solidFill>
-            </a:rPr>
+            <a:rPr lang="es-MX" i="1"/>
             <a:t>tidy data</a:t>
           </a:r>
           <a:r>
@@ -8182,11 +7991,7 @@
             <a:t>Analisis exploratorio de datos (</a:t>
           </a:r>
           <a:r>
-            <a:rPr lang="es-MX" i="1">
-              <a:solidFill>
-                <a:srgbClr val="FFFF00"/>
-              </a:solidFill>
-            </a:rPr>
+            <a:rPr lang="es-MX" i="1"/>
             <a:t>EDA</a:t>
           </a:r>
           <a:r>
@@ -8323,7 +8128,7 @@
         <a:p>
           <a:r>
             <a:rPr lang="es-ES_tradnl" sz="2000" b="1" dirty="0"/>
-            <a:t>Integración de datos de diferentes fuentes</a:t>
+            <a:t>Ingesta de datos</a:t>
           </a:r>
           <a:endParaRPr lang="en-US" sz="2000" b="1" dirty="0"/>
         </a:p>
@@ -8465,14 +8270,14 @@
         <a:lstStyle/>
         <a:p>
           <a:r>
-            <a:rPr lang="es-ES_tradnl" sz="2000"/>
+            <a:rPr lang="es-ES_tradnl" sz="2000" dirty="0"/>
             <a:t>Uso de </a:t>
           </a:r>
           <a:r>
-            <a:rPr lang="es-ES_tradnl" sz="2000" err="1"/>
+            <a:rPr lang="es-ES_tradnl" sz="2000" dirty="0" err="1"/>
             <a:t>APIs</a:t>
           </a:r>
-          <a:endParaRPr lang="en-US" sz="2000"/>
+          <a:endParaRPr lang="en-US" sz="2000" dirty="0"/>
         </a:p>
       </dgm:t>
     </dgm:pt>
@@ -8507,7 +8312,7 @@
         <a:p>
           <a:r>
             <a:rPr lang="es-ES_tradnl" sz="2000" noProof="0" dirty="0"/>
-            <a:t>Datos numéricos</a:t>
+            <a:t>Tipos de datos y procesamiento básico</a:t>
           </a:r>
         </a:p>
       </dgm:t>
@@ -8543,7 +8348,7 @@
         <a:p>
           <a:r>
             <a:rPr lang="es-ES_tradnl" sz="2000" noProof="0" dirty="0"/>
-            <a:t>Datos cualitativos</a:t>
+            <a:t>Valores faltantes e imputación</a:t>
           </a:r>
         </a:p>
       </dgm:t>
@@ -8579,7 +8384,7 @@
         <a:p>
           <a:r>
             <a:rPr lang="es-ES_tradnl" sz="2000" noProof="0" dirty="0"/>
-            <a:t>Cadenas de caracteres </a:t>
+            <a:t>Detección de anomalías</a:t>
           </a:r>
         </a:p>
       </dgm:t>
@@ -8606,7 +8411,7 @@
         </a:p>
       </dgm:t>
     </dgm:pt>
-    <dgm:pt modelId="{EEFE4BEA-3909-254E-8116-919B12A4DAA4}">
+    <dgm:pt modelId="{92517F8C-5DCA-494F-AF61-1EC816359398}">
       <dgm:prSet custT="1"/>
       <dgm:spPr/>
       <dgm:t>
@@ -8614,13 +8419,18 @@
         <a:lstStyle/>
         <a:p>
           <a:r>
-            <a:rPr lang="es-ES_tradnl" sz="2000" noProof="0" dirty="0"/>
-            <a:t>Series de tiempo</a:t>
+            <a:rPr lang="en-US" sz="2000" dirty="0"/>
+            <a:t>Calidad de </a:t>
           </a:r>
+          <a:r>
+            <a:rPr lang="en-US" sz="2000" dirty="0" err="1"/>
+            <a:t>datos</a:t>
+          </a:r>
+          <a:endParaRPr lang="en-US" sz="2000" dirty="0"/>
         </a:p>
       </dgm:t>
     </dgm:pt>
-    <dgm:pt modelId="{43D87DA1-7335-3343-B02F-27480E018ECB}" type="parTrans" cxnId="{A42CC99A-FF7C-8048-BA7D-B68384796EAF}">
+    <dgm:pt modelId="{51DB743A-962A-994F-A35D-F5045BB5005D}" type="parTrans" cxnId="{20C025BA-5C8F-EE41-BDD6-67EAE8A0CB40}">
       <dgm:prSet/>
       <dgm:spPr/>
       <dgm:t>
@@ -8631,7 +8441,7 @@
         </a:p>
       </dgm:t>
     </dgm:pt>
-    <dgm:pt modelId="{75C1F907-1544-CE48-A377-32EFCD30EA6E}" type="sibTrans" cxnId="{A42CC99A-FF7C-8048-BA7D-B68384796EAF}">
+    <dgm:pt modelId="{7F6E75AD-87B4-AD49-9A16-890D299CF3D9}" type="sibTrans" cxnId="{20C025BA-5C8F-EE41-BDD6-67EAE8A0CB40}">
       <dgm:prSet/>
       <dgm:spPr/>
       <dgm:t>
@@ -8729,11 +8539,11 @@
     <dgm:cxn modelId="{0AB13F59-DC91-B644-825D-B4F218CC71FD}" type="presOf" srcId="{C1FBF2FD-D5F6-433E-A9B7-98C41CA72876}" destId="{39F0AC47-9C09-764A-BEE7-49DEE8CF6828}" srcOrd="0" destOrd="0" presId="urn:microsoft.com/office/officeart/2005/8/layout/list1"/>
     <dgm:cxn modelId="{ADF1188A-111D-7E48-9269-5D3298A04B76}" type="presOf" srcId="{B6A5013B-62A2-704F-823C-7C45326746FB}" destId="{83632930-C7FF-0841-918A-C36DC17A70A7}" srcOrd="0" destOrd="0" presId="urn:microsoft.com/office/officeart/2005/8/layout/list1"/>
     <dgm:cxn modelId="{60386A9A-8DC9-534E-A6F5-8A88978E60CA}" type="presOf" srcId="{D990DF32-A9B1-CA49-B902-442088D602FE}" destId="{83632930-C7FF-0841-918A-C36DC17A70A7}" srcOrd="0" destOrd="2" presId="urn:microsoft.com/office/officeart/2005/8/layout/list1"/>
-    <dgm:cxn modelId="{A42CC99A-FF7C-8048-BA7D-B68384796EAF}" srcId="{C1FBF2FD-D5F6-433E-A9B7-98C41CA72876}" destId="{EEFE4BEA-3909-254E-8116-919B12A4DAA4}" srcOrd="3" destOrd="0" parTransId="{43D87DA1-7335-3343-B02F-27480E018ECB}" sibTransId="{75C1F907-1544-CE48-A377-32EFCD30EA6E}"/>
     <dgm:cxn modelId="{51B0E3A6-7350-DC4D-A1EF-3459992CDCCC}" type="presOf" srcId="{F75F9A99-4DE8-7D44-BB3B-D5D761A9F25E}" destId="{83632930-C7FF-0841-918A-C36DC17A70A7}" srcOrd="0" destOrd="1" presId="urn:microsoft.com/office/officeart/2005/8/layout/list1"/>
+    <dgm:cxn modelId="{20C025BA-5C8F-EE41-BDD6-67EAE8A0CB40}" srcId="{1F7478DF-370E-4271-9878-0596A143015E}" destId="{92517F8C-5DCA-494F-AF61-1EC816359398}" srcOrd="2" destOrd="0" parTransId="{51DB743A-962A-994F-A35D-F5045BB5005D}" sibTransId="{7F6E75AD-87B4-AD49-9A16-890D299CF3D9}"/>
     <dgm:cxn modelId="{A12EC3C1-A6AC-534D-B53F-D5C22BA6444C}" type="presOf" srcId="{C1FBF2FD-D5F6-433E-A9B7-98C41CA72876}" destId="{4374A502-B6DD-4C45-9A4A-735CBA052588}" srcOrd="1" destOrd="0" presId="urn:microsoft.com/office/officeart/2005/8/layout/list1"/>
     <dgm:cxn modelId="{29F1B1D1-E09B-4648-8FF7-73C47D3958A2}" srcId="{C1FBF2FD-D5F6-433E-A9B7-98C41CA72876}" destId="{B6A5013B-62A2-704F-823C-7C45326746FB}" srcOrd="0" destOrd="0" parTransId="{0B83B5F8-BEB1-0B4E-98E9-E08E77C85342}" sibTransId="{C5209B31-6623-B143-BDF1-5B60D9A8BFC1}"/>
-    <dgm:cxn modelId="{8DBBE3E5-2CFD-4F4F-95C5-0871C202443B}" type="presOf" srcId="{EEFE4BEA-3909-254E-8116-919B12A4DAA4}" destId="{83632930-C7FF-0841-918A-C36DC17A70A7}" srcOrd="0" destOrd="3" presId="urn:microsoft.com/office/officeart/2005/8/layout/list1"/>
+    <dgm:cxn modelId="{6F487DD4-4513-8840-AD4F-9C18B87F4056}" type="presOf" srcId="{92517F8C-5DCA-494F-AF61-1EC816359398}" destId="{E70BA90D-B052-EB4F-B3AC-36D0ACA73C53}" srcOrd="0" destOrd="2" presId="urn:microsoft.com/office/officeart/2005/8/layout/list1"/>
     <dgm:cxn modelId="{474F52FA-3634-4B3B-A4F3-4411534A3EDC}" srcId="{1F7478DF-370E-4271-9878-0596A143015E}" destId="{11E2E8F2-3DE3-490E-9DAD-007843270996}" srcOrd="0" destOrd="0" parTransId="{CA598A7E-3A3E-47D5-AA91-6597A92EA3E8}" sibTransId="{FFE5E4AB-2FC9-4912-8CA6-4D559C02FFC8}"/>
     <dgm:cxn modelId="{C27C0A97-8050-3E4C-8025-75AD724C4462}" type="presParOf" srcId="{F495A023-2A15-BF4C-B787-93921FCB4C9F}" destId="{1B7CA765-3DFD-504C-81AC-9FD0D5A4430D}" srcOrd="0" destOrd="0" presId="urn:microsoft.com/office/officeart/2005/8/layout/list1"/>
     <dgm:cxn modelId="{7BECAD13-9279-D042-B6E7-8F2C63D29C0E}" type="presParOf" srcId="{1B7CA765-3DFD-504C-81AC-9FD0D5A4430D}" destId="{88EC8E4D-75FC-CE4A-AB41-EABB66041FD9}" srcOrd="0" destOrd="0" presId="urn:microsoft.com/office/officeart/2005/8/layout/list1"/>
@@ -11496,7 +11306,7 @@
           <a:avLst/>
         </a:prstGeom>
         <a:solidFill>
-          <a:schemeClr val="accent5">
+          <a:schemeClr val="accent2">
             <a:hueOff val="0"/>
             <a:satOff val="0"/>
             <a:lumOff val="0"/>
@@ -11571,11 +11381,7 @@
             <a:t>(</a:t>
           </a:r>
           <a:r>
-            <a:rPr lang="es-MX" sz="2000" i="1" kern="1200">
-              <a:solidFill>
-                <a:srgbClr val="FFFF00"/>
-              </a:solidFill>
-            </a:rPr>
+            <a:rPr lang="es-MX" sz="2000" i="1" kern="1200"/>
             <a:t>raw data</a:t>
           </a:r>
           <a:r>
@@ -11603,7 +11409,7 @@
           <a:avLst/>
         </a:prstGeom>
         <a:solidFill>
-          <a:schemeClr val="accent5">
+          <a:schemeClr val="accent2">
             <a:hueOff val="0"/>
             <a:satOff val="0"/>
             <a:lumOff val="0"/>
@@ -11678,11 +11484,7 @@
             <a:t>(</a:t>
           </a:r>
           <a:r>
-            <a:rPr lang="es-MX" sz="2000" i="1" kern="1200">
-              <a:solidFill>
-                <a:srgbClr val="FFFF00"/>
-              </a:solidFill>
-            </a:rPr>
+            <a:rPr lang="es-MX" sz="2000" i="1" kern="1200"/>
             <a:t>data wrangling</a:t>
           </a:r>
           <a:r>
@@ -11710,7 +11512,7 @@
           <a:avLst/>
         </a:prstGeom>
         <a:solidFill>
-          <a:schemeClr val="accent5">
+          <a:schemeClr val="accent2">
             <a:hueOff val="0"/>
             <a:satOff val="0"/>
             <a:lumOff val="0"/>
@@ -11785,11 +11587,7 @@
             <a:t>(</a:t>
           </a:r>
           <a:r>
-            <a:rPr lang="es-MX" sz="2000" i="1" kern="1200">
-              <a:solidFill>
-                <a:srgbClr val="FFFF00"/>
-              </a:solidFill>
-            </a:rPr>
+            <a:rPr lang="es-MX" sz="2000" i="1" kern="1200"/>
             <a:t>tidy data</a:t>
           </a:r>
           <a:r>
@@ -11817,7 +11615,7 @@
           <a:avLst/>
         </a:prstGeom>
         <a:solidFill>
-          <a:schemeClr val="accent5">
+          <a:schemeClr val="accent2">
             <a:hueOff val="0"/>
             <a:satOff val="0"/>
             <a:lumOff val="0"/>
@@ -11874,11 +11672,7 @@
             <a:t>Analisis exploratorio de datos (</a:t>
           </a:r>
           <a:r>
-            <a:rPr lang="es-MX" sz="2000" i="1" kern="1200">
-              <a:solidFill>
-                <a:srgbClr val="FFFF00"/>
-              </a:solidFill>
-            </a:rPr>
+            <a:rPr lang="es-MX" sz="2000" i="1" kern="1200"/>
             <a:t>EDA</a:t>
           </a:r>
           <a:r>
@@ -11912,7 +11706,7 @@
       <dsp:spPr>
         <a:xfrm>
           <a:off x="0" y="683518"/>
-          <a:ext cx="6797675" cy="1700999"/>
+          <a:ext cx="6797675" cy="2019937"/>
         </a:xfrm>
         <a:prstGeom prst="rect">
           <a:avLst/>
@@ -12021,19 +11815,42 @@
             <a:buChar char="•"/>
           </a:pPr>
           <a:r>
-            <a:rPr lang="es-ES_tradnl" sz="2000" kern="1200"/>
+            <a:rPr lang="es-ES_tradnl" sz="2000" kern="1200" dirty="0"/>
             <a:t>Uso de </a:t>
           </a:r>
           <a:r>
-            <a:rPr lang="es-ES_tradnl" sz="2000" kern="1200" err="1"/>
+            <a:rPr lang="es-ES_tradnl" sz="2000" kern="1200" dirty="0" err="1"/>
             <a:t>APIs</a:t>
           </a:r>
-          <a:endParaRPr lang="en-US" sz="2000" kern="1200"/>
+          <a:endParaRPr lang="en-US" sz="2000" kern="1200" dirty="0"/>
+        </a:p>
+        <a:p>
+          <a:pPr marL="228600" lvl="1" indent="-228600" algn="l" defTabSz="889000">
+            <a:lnSpc>
+              <a:spcPct val="90000"/>
+            </a:lnSpc>
+            <a:spcBef>
+              <a:spcPct val="0"/>
+            </a:spcBef>
+            <a:spcAft>
+              <a:spcPct val="15000"/>
+            </a:spcAft>
+            <a:buChar char="•"/>
+          </a:pPr>
+          <a:r>
+            <a:rPr lang="en-US" sz="2000" kern="1200" dirty="0"/>
+            <a:t>Calidad de </a:t>
+          </a:r>
+          <a:r>
+            <a:rPr lang="en-US" sz="2000" kern="1200" dirty="0" err="1"/>
+            <a:t>datos</a:t>
+          </a:r>
+          <a:endParaRPr lang="en-US" sz="2000" kern="1200" dirty="0"/>
         </a:p>
       </dsp:txBody>
       <dsp:txXfrm>
         <a:off x="0" y="683518"/>
-        <a:ext cx="6797675" cy="1700999"/>
+        <a:ext cx="6797675" cy="2019937"/>
       </dsp:txXfrm>
     </dsp:sp>
     <dsp:sp modelId="{A9678DA4-BA79-DB4E-AA2A-DE89AF94C46A}">
@@ -12104,7 +11921,7 @@
           </a:pPr>
           <a:r>
             <a:rPr lang="es-ES_tradnl" sz="2000" b="1" kern="1200" dirty="0"/>
-            <a:t>Integración de datos de diferentes fuentes</a:t>
+            <a:t>Ingesta de datos</a:t>
           </a:r>
           <a:endParaRPr lang="en-US" sz="2000" b="1" kern="1200" dirty="0"/>
         </a:p>
@@ -12121,8 +11938,8 @@
       </dsp:nvSpPr>
       <dsp:spPr>
         <a:xfrm>
-          <a:off x="0" y="3291718"/>
-          <a:ext cx="6797675" cy="2338874"/>
+          <a:off x="0" y="3610656"/>
+          <a:ext cx="6797675" cy="2019937"/>
         </a:xfrm>
         <a:prstGeom prst="rect">
           <a:avLst/>
@@ -12181,7 +11998,7 @@
           </a:pPr>
           <a:r>
             <a:rPr lang="es-ES_tradnl" sz="2000" kern="1200" noProof="0" dirty="0"/>
-            <a:t>Datos numéricos</a:t>
+            <a:t>Tipos de datos y procesamiento básico</a:t>
           </a:r>
         </a:p>
         <a:p>
@@ -12199,7 +12016,7 @@
           </a:pPr>
           <a:r>
             <a:rPr lang="es-ES_tradnl" sz="2000" kern="1200" noProof="0" dirty="0"/>
-            <a:t>Datos cualitativos</a:t>
+            <a:t>Valores faltantes e imputación</a:t>
           </a:r>
         </a:p>
         <a:p>
@@ -12217,31 +12034,13 @@
           </a:pPr>
           <a:r>
             <a:rPr lang="es-ES_tradnl" sz="2000" kern="1200" noProof="0" dirty="0"/>
-            <a:t>Cadenas de caracteres </a:t>
-          </a:r>
-        </a:p>
-        <a:p>
-          <a:pPr marL="228600" lvl="1" indent="-228600" algn="l" defTabSz="889000">
-            <a:lnSpc>
-              <a:spcPct val="90000"/>
-            </a:lnSpc>
-            <a:spcBef>
-              <a:spcPct val="0"/>
-            </a:spcBef>
-            <a:spcAft>
-              <a:spcPct val="15000"/>
-            </a:spcAft>
-            <a:buChar char="•"/>
-          </a:pPr>
-          <a:r>
-            <a:rPr lang="es-ES_tradnl" sz="2000" kern="1200" noProof="0" dirty="0"/>
-            <a:t>Series de tiempo</a:t>
+            <a:t>Detección de anomalías</a:t>
           </a:r>
         </a:p>
       </dsp:txBody>
       <dsp:txXfrm>
-        <a:off x="0" y="3291718"/>
-        <a:ext cx="6797675" cy="2338874"/>
+        <a:off x="0" y="3610656"/>
+        <a:ext cx="6797675" cy="2019937"/>
       </dsp:txXfrm>
     </dsp:sp>
     <dsp:sp modelId="{4374A502-B6DD-4C45-9A4A-735CBA052588}">
@@ -12251,7 +12050,7 @@
       </dsp:nvSpPr>
       <dsp:spPr>
         <a:xfrm>
-          <a:off x="339883" y="2627518"/>
+          <a:off x="339883" y="2946456"/>
           <a:ext cx="5609740" cy="1328400"/>
         </a:xfrm>
         <a:prstGeom prst="roundRect">
@@ -12318,7 +12117,7 @@
         </a:p>
       </dsp:txBody>
       <dsp:txXfrm>
-        <a:off x="404730" y="2692365"/>
+        <a:off x="404730" y="3011303"/>
         <a:ext cx="5480046" cy="1198706"/>
       </dsp:txXfrm>
     </dsp:sp>
@@ -23173,7 +22972,7 @@
           <a:p>
             <a:fld id="{324A9B44-4828-EE48-BF9C-CBD1FA799CB2}" type="datetimeFigureOut">
               <a:rPr lang="es-ES_tradnl" smtClean="0"/>
-              <a:t>7/8/23</a:t>
+              <a:t>6/8/24</a:t>
             </a:fld>
             <a:endParaRPr lang="es-ES_tradnl"/>
           </a:p>
@@ -23685,7 +23484,7 @@
           <a:p>
             <a:fld id="{49D12D98-04F8-C542-A6E9-122D9DBEC8FD}" type="datetime1">
               <a:rPr lang="es-MX" smtClean="0"/>
-              <a:t>07/08/23</a:t>
+              <a:t>06/08/24</a:t>
             </a:fld>
             <a:endParaRPr lang="en-US"/>
           </a:p>
@@ -23873,7 +23672,7 @@
           <a:p>
             <a:fld id="{0A038124-6A46-A449-9989-05131BFDA31F}" type="datetime1">
               <a:rPr lang="es-MX" smtClean="0"/>
-              <a:t>07/08/23</a:t>
+              <a:t>06/08/24</a:t>
             </a:fld>
             <a:endParaRPr lang="en-US"/>
           </a:p>
@@ -24115,7 +23914,7 @@
           <a:p>
             <a:fld id="{563D23C5-55F1-8B47-AB49-A5DDC5F64A62}" type="datetime1">
               <a:rPr lang="es-MX" smtClean="0"/>
-              <a:t>07/08/23</a:t>
+              <a:t>06/08/24</a:t>
             </a:fld>
             <a:endParaRPr lang="en-US"/>
           </a:p>
@@ -24303,7 +24102,7 @@
           <a:p>
             <a:fld id="{42655641-0FAA-A646-995E-E89A531CC860}" type="datetime1">
               <a:rPr lang="es-MX" smtClean="0"/>
-              <a:t>07/08/23</a:t>
+              <a:t>06/08/24</a:t>
             </a:fld>
             <a:endParaRPr lang="en-US"/>
           </a:p>
@@ -24676,7 +24475,7 @@
           <a:p>
             <a:fld id="{E38FF827-A2F6-7F40-A0C4-D5176BE807EC}" type="datetime1">
               <a:rPr lang="es-MX" smtClean="0"/>
-              <a:t>07/08/23</a:t>
+              <a:t>06/08/24</a:t>
             </a:fld>
             <a:endParaRPr lang="en-US"/>
           </a:p>
@@ -24931,7 +24730,7 @@
           <a:p>
             <a:fld id="{6DCE5B51-294A-6040-BD86-0F3F2FE93ED7}" type="datetime1">
               <a:rPr lang="es-MX" smtClean="0"/>
-              <a:t>07/08/23</a:t>
+              <a:t>06/08/24</a:t>
             </a:fld>
             <a:endParaRPr lang="en-US"/>
           </a:p>
@@ -25328,7 +25127,7 @@
           <a:p>
             <a:fld id="{E6C14B89-0E7F-324D-9ED0-93C9CC0B2BEE}" type="datetime1">
               <a:rPr lang="es-MX" smtClean="0"/>
-              <a:t>07/08/23</a:t>
+              <a:t>06/08/24</a:t>
             </a:fld>
             <a:endParaRPr lang="en-US"/>
           </a:p>
@@ -25464,7 +25263,7 @@
           <a:p>
             <a:fld id="{12A3A656-C5B3-8C4F-901C-AC70F2A1D850}" type="datetime1">
               <a:rPr lang="es-MX" smtClean="0"/>
-              <a:t>07/08/23</a:t>
+              <a:t>06/08/24</a:t>
             </a:fld>
             <a:endParaRPr lang="en-US"/>
           </a:p>
@@ -25621,7 +25420,7 @@
           <a:p>
             <a:fld id="{DE88DC43-BF74-6A46-874A-FC88FBCA6573}" type="datetime1">
               <a:rPr lang="es-MX" smtClean="0"/>
-              <a:t>07/08/23</a:t>
+              <a:t>06/08/24</a:t>
             </a:fld>
             <a:endParaRPr lang="en-US"/>
           </a:p>
@@ -25950,7 +25749,7 @@
           <a:p>
             <a:fld id="{CA67A850-70B0-664E-9DAC-92F8E98DA82D}" type="datetime1">
               <a:rPr lang="es-MX" smtClean="0"/>
-              <a:t>07/08/23</a:t>
+              <a:t>06/08/24</a:t>
             </a:fld>
             <a:endParaRPr lang="en-US"/>
           </a:p>
@@ -26299,7 +26098,7 @@
           <a:p>
             <a:fld id="{F5DBB4EA-EB6F-944D-9298-0BE7B40FCEBE}" type="datetime1">
               <a:rPr lang="es-MX" smtClean="0"/>
-              <a:t>07/08/23</a:t>
+              <a:t>06/08/24</a:t>
             </a:fld>
             <a:endParaRPr lang="en-US"/>
           </a:p>
@@ -26560,7 +26359,7 @@
           <a:p>
             <a:fld id="{0ECAF8A3-8507-EB4A-9023-5E0BA237C12F}" type="datetime1">
               <a:rPr lang="es-MX" smtClean="0"/>
-              <a:t>07/08/23</a:t>
+              <a:t>06/08/24</a:t>
             </a:fld>
             <a:endParaRPr lang="en-US"/>
           </a:p>
@@ -27190,6 +26989,13 @@
             <a:schemeClr val="lt1"/>
           </a:fontRef>
         </p:style>
+        <p:txBody>
+          <a:bodyPr/>
+          <a:lstStyle/>
+          <a:p>
+            <a:endParaRPr lang="es-ES_tradnl"/>
+          </a:p>
+        </p:txBody>
       </p:sp>
       <p:sp>
         <p:nvSpPr>
@@ -27572,6 +27378,13 @@
             <a:schemeClr val="lt1"/>
           </a:fontRef>
         </p:style>
+        <p:txBody>
+          <a:bodyPr/>
+          <a:lstStyle/>
+          <a:p>
+            <a:endParaRPr lang="es-ES_tradnl"/>
+          </a:p>
+        </p:txBody>
       </p:sp>
       <p:sp>
         <p:nvSpPr>
@@ -27666,6 +27479,13 @@
             <a:schemeClr val="lt1"/>
           </a:fontRef>
         </p:style>
+        <p:txBody>
+          <a:bodyPr/>
+          <a:lstStyle/>
+          <a:p>
+            <a:endParaRPr lang="es-ES_tradnl"/>
+          </a:p>
+        </p:txBody>
       </p:sp>
       <p:pic>
         <p:nvPicPr>
@@ -27890,6 +27710,13 @@
             <a:schemeClr val="lt1"/>
           </a:fontRef>
         </p:style>
+        <p:txBody>
+          <a:bodyPr/>
+          <a:lstStyle/>
+          <a:p>
+            <a:endParaRPr lang="es-ES_tradnl"/>
+          </a:p>
+        </p:txBody>
       </p:sp>
       <p:sp>
         <p:nvSpPr>
@@ -27984,6 +27811,13 @@
             <a:schemeClr val="lt1"/>
           </a:fontRef>
         </p:style>
+        <p:txBody>
+          <a:bodyPr/>
+          <a:lstStyle/>
+          <a:p>
+            <a:endParaRPr lang="es-ES_tradnl"/>
+          </a:p>
+        </p:txBody>
       </p:sp>
       <p:pic>
         <p:nvPicPr>
@@ -28223,6 +28057,13 @@
             <a:schemeClr val="lt1"/>
           </a:fontRef>
         </p:style>
+        <p:txBody>
+          <a:bodyPr/>
+          <a:lstStyle/>
+          <a:p>
+            <a:endParaRPr lang="es-ES_tradnl"/>
+          </a:p>
+        </p:txBody>
       </p:sp>
       <p:sp>
         <p:nvSpPr>
@@ -28317,6 +28158,13 @@
             <a:schemeClr val="lt1"/>
           </a:fontRef>
         </p:style>
+        <p:txBody>
+          <a:bodyPr/>
+          <a:lstStyle/>
+          <a:p>
+            <a:endParaRPr lang="es-ES_tradnl"/>
+          </a:p>
+        </p:txBody>
       </p:sp>
       <p:sp>
         <p:nvSpPr>
@@ -28362,14 +28210,14 @@
           <p:nvPr>
             <p:extLst>
               <p:ext uri="{D42A27DB-BD31-4B8C-83A1-F6EECF244321}">
-                <p14:modId xmlns:p14="http://schemas.microsoft.com/office/powerpoint/2010/main" val="1120338731"/>
+                <p14:modId xmlns:p14="http://schemas.microsoft.com/office/powerpoint/2010/main" val="2063420133"/>
               </p:ext>
             </p:extLst>
           </p:nvPr>
         </p:nvGraphicFramePr>
         <p:xfrm>
-          <a:off x="293511" y="2023964"/>
-          <a:ext cx="11661422" cy="4513864"/>
+          <a:off x="295769" y="2135841"/>
+          <a:ext cx="11661422" cy="4034118"/>
         </p:xfrm>
         <a:graphic>
           <a:graphicData uri="http://schemas.openxmlformats.org/drawingml/2006/chart">
@@ -28544,6 +28392,13 @@
             <a:schemeClr val="lt1"/>
           </a:fontRef>
         </p:style>
+        <p:txBody>
+          <a:bodyPr/>
+          <a:lstStyle/>
+          <a:p>
+            <a:endParaRPr lang="es-ES_tradnl"/>
+          </a:p>
+        </p:txBody>
       </p:sp>
       <p:sp>
         <p:nvSpPr>
@@ -28655,7 +28510,7 @@
             <p:ph idx="1"/>
             <p:extLst>
               <p:ext uri="{D42A27DB-BD31-4B8C-83A1-F6EECF244321}">
-                <p14:modId xmlns:p14="http://schemas.microsoft.com/office/powerpoint/2010/main" val="3116703952"/>
+                <p14:modId xmlns:p14="http://schemas.microsoft.com/office/powerpoint/2010/main" val="417673350"/>
               </p:ext>
             </p:extLst>
           </p:nvPr>
@@ -28825,6 +28680,13 @@
             <a:schemeClr val="lt1"/>
           </a:fontRef>
         </p:style>
+        <p:txBody>
+          <a:bodyPr/>
+          <a:lstStyle/>
+          <a:p>
+            <a:endParaRPr lang="es-ES_tradnl"/>
+          </a:p>
+        </p:txBody>
       </p:sp>
       <p:sp>
         <p:nvSpPr>
@@ -28935,7 +28797,7 @@
             <p:ph idx="1"/>
             <p:extLst>
               <p:ext uri="{D42A27DB-BD31-4B8C-83A1-F6EECF244321}">
-                <p14:modId xmlns:p14="http://schemas.microsoft.com/office/powerpoint/2010/main" val="839892836"/>
+                <p14:modId xmlns:p14="http://schemas.microsoft.com/office/powerpoint/2010/main" val="3121080093"/>
               </p:ext>
             </p:extLst>
           </p:nvPr>
@@ -29105,6 +28967,13 @@
             <a:schemeClr val="lt1"/>
           </a:fontRef>
         </p:style>
+        <p:txBody>
+          <a:bodyPr/>
+          <a:lstStyle/>
+          <a:p>
+            <a:endParaRPr lang="es-ES_tradnl"/>
+          </a:p>
+        </p:txBody>
       </p:sp>
       <p:sp>
         <p:nvSpPr>
@@ -29385,6 +29254,13 @@
             <a:schemeClr val="lt1"/>
           </a:fontRef>
         </p:style>
+        <p:txBody>
+          <a:bodyPr/>
+          <a:lstStyle/>
+          <a:p>
+            <a:endParaRPr lang="es-ES_tradnl"/>
+          </a:p>
+        </p:txBody>
       </p:sp>
       <p:sp>
         <p:nvSpPr>
@@ -29753,6 +29629,13 @@
             <a:schemeClr val="lt1"/>
           </a:fontRef>
         </p:style>
+        <p:txBody>
+          <a:bodyPr/>
+          <a:lstStyle/>
+          <a:p>
+            <a:endParaRPr lang="es-ES_tradnl"/>
+          </a:p>
+        </p:txBody>
       </p:sp>
       <p:sp>
         <p:nvSpPr>
@@ -29958,12 +29841,8 @@
           <a:lstStyle/>
           <a:p>
             <a:r>
-              <a:rPr lang="es-ES_tradnl" dirty="0" err="1"/>
-              <a:t>Metodo</a:t>
-            </a:r>
-            <a:r>
               <a:rPr lang="es-ES_tradnl" dirty="0"/>
-              <a:t> de trabajo</a:t>
+              <a:t>Método de trabajo</a:t>
             </a:r>
           </a:p>
         </p:txBody>
@@ -30077,6 +29956,13 @@
             <a:schemeClr val="lt1"/>
           </a:fontRef>
         </p:style>
+        <p:txBody>
+          <a:bodyPr/>
+          <a:lstStyle/>
+          <a:p>
+            <a:endParaRPr lang="es-ES_tradnl"/>
+          </a:p>
+        </p:txBody>
       </p:sp>
       <p:graphicFrame>
         <p:nvGraphicFramePr>
@@ -30302,6 +30188,13 @@
             <a:schemeClr val="lt1"/>
           </a:fontRef>
         </p:style>
+        <p:txBody>
+          <a:bodyPr/>
+          <a:lstStyle/>
+          <a:p>
+            <a:endParaRPr lang="es-ES_tradnl"/>
+          </a:p>
+        </p:txBody>
       </p:sp>
       <p:sp>
         <p:nvSpPr>
@@ -30425,34 +30318,6 @@
             </a:r>
             <a:r>
               <a:rPr lang="es-ES_tradnl" sz="2000" dirty="0"/>
-              <a:t>, </a:t>
-            </a:r>
-            <a:r>
-              <a:rPr lang="es-ES_tradnl" sz="2000" dirty="0">
-                <a:hlinkClick r:id="rId5"/>
-              </a:rPr>
-              <a:t>EdX</a:t>
-            </a:r>
-            <a:r>
-              <a:rPr lang="es-ES_tradnl" sz="2000" dirty="0"/>
-              <a:t>, </a:t>
-            </a:r>
-            <a:r>
-              <a:rPr lang="es-ES_tradnl" sz="2000" dirty="0">
-                <a:hlinkClick r:id="rId6"/>
-              </a:rPr>
-              <a:t>Coursera</a:t>
-            </a:r>
-            <a:r>
-              <a:rPr lang="es-ES_tradnl" sz="2000" dirty="0"/>
-              <a:t> y otros </a:t>
-            </a:r>
-            <a:r>
-              <a:rPr lang="es-ES_tradnl" sz="2000" dirty="0" err="1"/>
-              <a:t>MOOCs</a:t>
-            </a:r>
-            <a:r>
-              <a:rPr lang="es-ES_tradnl" sz="2000" dirty="0"/>
               <a:t> para partes de contenido de cursos</a:t>
             </a:r>
           </a:p>
@@ -30464,7 +30329,7 @@
             </a:pPr>
             <a:r>
               <a:rPr lang="es-ES_tradnl" sz="2000" dirty="0">
-                <a:hlinkClick r:id="rId7"/>
+                <a:hlinkClick r:id="rId5"/>
               </a:rPr>
               <a:t>Kaggle</a:t>
             </a:r>
@@ -30481,7 +30346,7 @@
             </a:pPr>
             <a:r>
               <a:rPr lang="es-ES_tradnl" sz="2000" dirty="0">
-                <a:hlinkClick r:id="rId8"/>
+                <a:hlinkClick r:id="rId6"/>
               </a:rPr>
               <a:t>Github</a:t>
             </a:r>
@@ -30498,7 +30363,7 @@
             </a:pPr>
             <a:r>
               <a:rPr lang="es-ES_tradnl" sz="2000" dirty="0">
-                <a:hlinkClick r:id="rId9"/>
+                <a:hlinkClick r:id="rId7"/>
               </a:rPr>
               <a:t>Medium</a:t>
             </a:r>
@@ -30563,6 +30428,13 @@
             <a:schemeClr val="lt1"/>
           </a:fontRef>
         </p:style>
+        <p:txBody>
+          <a:bodyPr/>
+          <a:lstStyle/>
+          <a:p>
+            <a:endParaRPr lang="es-ES_tradnl"/>
+          </a:p>
+        </p:txBody>
       </p:sp>
       <p:sp>
         <p:nvSpPr>
@@ -30847,6 +30719,13 @@
             <a:schemeClr val="lt1"/>
           </a:fontRef>
         </p:style>
+        <p:txBody>
+          <a:bodyPr/>
+          <a:lstStyle/>
+          <a:p>
+            <a:endParaRPr lang="es-ES_tradnl"/>
+          </a:p>
+        </p:txBody>
       </p:sp>
       <p:graphicFrame>
         <p:nvGraphicFramePr>
@@ -31072,6 +30951,13 @@
             <a:schemeClr val="lt1"/>
           </a:fontRef>
         </p:style>
+        <p:txBody>
+          <a:bodyPr/>
+          <a:lstStyle/>
+          <a:p>
+            <a:endParaRPr lang="es-ES_tradnl"/>
+          </a:p>
+        </p:txBody>
       </p:sp>
       <p:sp>
         <p:nvSpPr>
@@ -31166,6 +31052,13 @@
             <a:schemeClr val="lt1"/>
           </a:fontRef>
         </p:style>
+        <p:txBody>
+          <a:bodyPr/>
+          <a:lstStyle/>
+          <a:p>
+            <a:endParaRPr lang="es-ES_tradnl"/>
+          </a:p>
+        </p:txBody>
       </p:sp>
       <p:sp>
         <p:nvSpPr>
@@ -32795,6 +32688,13 @@
             <a:schemeClr val="lt1"/>
           </a:fontRef>
         </p:style>
+        <p:txBody>
+          <a:bodyPr/>
+          <a:lstStyle/>
+          <a:p>
+            <a:endParaRPr lang="es-ES_tradnl"/>
+          </a:p>
+        </p:txBody>
       </p:sp>
       <p:sp>
         <p:nvSpPr>
@@ -32889,6 +32789,13 @@
             <a:schemeClr val="lt1"/>
           </a:fontRef>
         </p:style>
+        <p:txBody>
+          <a:bodyPr/>
+          <a:lstStyle/>
+          <a:p>
+            <a:endParaRPr lang="es-ES_tradnl"/>
+          </a:p>
+        </p:txBody>
       </p:sp>
       <p:sp>
         <p:nvSpPr>
@@ -33460,6 +33367,13 @@
             <a:schemeClr val="lt1"/>
           </a:fontRef>
         </p:style>
+        <p:txBody>
+          <a:bodyPr/>
+          <a:lstStyle/>
+          <a:p>
+            <a:endParaRPr lang="es-ES_tradnl"/>
+          </a:p>
+        </p:txBody>
       </p:sp>
       <p:sp>
         <p:nvSpPr>
@@ -33554,6 +33468,13 @@
             <a:schemeClr val="lt1"/>
           </a:fontRef>
         </p:style>
+        <p:txBody>
+          <a:bodyPr/>
+          <a:lstStyle/>
+          <a:p>
+            <a:endParaRPr lang="es-ES_tradnl"/>
+          </a:p>
+        </p:txBody>
       </p:sp>
       <p:pic>
         <p:nvPicPr>
@@ -33780,6 +33701,13 @@
             <a:schemeClr val="lt1"/>
           </a:fontRef>
         </p:style>
+        <p:txBody>
+          <a:bodyPr/>
+          <a:lstStyle/>
+          <a:p>
+            <a:endParaRPr lang="es-ES_tradnl"/>
+          </a:p>
+        </p:txBody>
       </p:sp>
       <p:sp>
         <p:nvSpPr>
@@ -33874,6 +33802,13 @@
             <a:schemeClr val="lt1"/>
           </a:fontRef>
         </p:style>
+        <p:txBody>
+          <a:bodyPr/>
+          <a:lstStyle/>
+          <a:p>
+            <a:endParaRPr lang="es-ES_tradnl"/>
+          </a:p>
+        </p:txBody>
       </p:sp>
       <p:pic>
         <p:nvPicPr>
@@ -34113,6 +34048,13 @@
             <a:schemeClr val="lt1"/>
           </a:fontRef>
         </p:style>
+        <p:txBody>
+          <a:bodyPr/>
+          <a:lstStyle/>
+          <a:p>
+            <a:endParaRPr lang="es-ES_tradnl"/>
+          </a:p>
+        </p:txBody>
       </p:sp>
       <p:sp>
         <p:nvSpPr>
@@ -34207,6 +34149,13 @@
             <a:schemeClr val="lt1"/>
           </a:fontRef>
         </p:style>
+        <p:txBody>
+          <a:bodyPr/>
+          <a:lstStyle/>
+          <a:p>
+            <a:endParaRPr lang="es-ES_tradnl"/>
+          </a:p>
+        </p:txBody>
       </p:sp>
       <p:pic>
         <p:nvPicPr>

</xml_diff>

<commit_message>
cambios presentacion de introducción al curso
</commit_message>
<xml_diff>
--- a/slides/inicial.pptx
+++ b/slides/inicial.pptx
@@ -461,6 +461,7 @@
           </a:p>
         </c:txPr>
         <c:crossAx val="1554787968"/>
+        <c:crosses val="autoZero"/>
         <c:crossBetween val="between"/>
       </c:valAx>
       <c:catAx>
@@ -508,6 +509,7 @@
           </a:p>
         </c:txPr>
         <c:crossAx val="1554786240"/>
+        <c:crosses val="autoZero"/>
         <c:auto val="1"/>
         <c:lblAlgn val="ctr"/>
         <c:lblOffset val="100"/>
@@ -7039,7 +7041,7 @@
             <a:defRPr b="1"/>
           </a:pPr>
           <a:r>
-            <a:rPr lang="en-US" sz="2800"/>
+            <a:rPr lang="es-ES_tradnl" sz="2800" dirty="0"/>
             <a:t>martes</a:t>
           </a:r>
         </a:p>
@@ -7052,7 +7054,7 @@
         <a:bodyPr/>
         <a:lstStyle/>
         <a:p>
-          <a:endParaRPr lang="en-US" sz="2400"/>
+          <a:endParaRPr lang="es-ES_tradnl" sz="2400" dirty="0"/>
         </a:p>
       </dgm:t>
     </dgm:pt>
@@ -7063,7 +7065,7 @@
         <a:bodyPr/>
         <a:lstStyle/>
         <a:p>
-          <a:endParaRPr lang="en-US" sz="2400"/>
+          <a:endParaRPr lang="es-ES_tradnl" sz="2400" dirty="0"/>
         </a:p>
       </dgm:t>
     </dgm:pt>
@@ -7075,22 +7077,9 @@
         <a:lstStyle/>
         <a:p>
           <a:r>
-            <a:rPr lang="en-US" sz="1800" dirty="0"/>
-            <a:t>Dos horas el martes (6 a 8 p.m.) con el </a:t>
+            <a:rPr lang="es-ES_tradnl" sz="1800" dirty="0"/>
+            <a:t>Dos horas el martes (6 a 8 p.m.) con el tema nuevo de la semana</a:t>
           </a:r>
-          <a:r>
-            <a:rPr lang="en-US" sz="1800" dirty="0" err="1"/>
-            <a:t>tema</a:t>
-          </a:r>
-          <a:r>
-            <a:rPr lang="en-US" sz="1800" dirty="0"/>
-            <a:t> nuevo de la </a:t>
-          </a:r>
-          <a:r>
-            <a:rPr lang="en-US" sz="1800" dirty="0" err="1"/>
-            <a:t>semana</a:t>
-          </a:r>
-          <a:endParaRPr lang="en-US" sz="1800" dirty="0"/>
         </a:p>
       </dgm:t>
     </dgm:pt>
@@ -7101,7 +7090,7 @@
         <a:bodyPr/>
         <a:lstStyle/>
         <a:p>
-          <a:endParaRPr lang="en-US" sz="2400"/>
+          <a:endParaRPr lang="es-ES_tradnl" sz="2400" dirty="0"/>
         </a:p>
       </dgm:t>
     </dgm:pt>
@@ -7112,7 +7101,7 @@
         <a:bodyPr/>
         <a:lstStyle/>
         <a:p>
-          <a:endParaRPr lang="en-US" sz="2400"/>
+          <a:endParaRPr lang="es-ES_tradnl" sz="2400" dirty="0"/>
         </a:p>
       </dgm:t>
     </dgm:pt>
@@ -7127,18 +7116,9 @@
             <a:defRPr b="1"/>
           </a:pPr>
           <a:r>
-            <a:rPr lang="en-US" sz="2800" dirty="0" err="1"/>
-            <a:t>jueves</a:t>
+            <a:rPr lang="es-ES_tradnl" sz="2800" dirty="0"/>
+            <a:t>jueves y viernes</a:t>
           </a:r>
-          <a:r>
-            <a:rPr lang="en-US" sz="2800" dirty="0"/>
-            <a:t> y </a:t>
-          </a:r>
-          <a:r>
-            <a:rPr lang="en-US" sz="2800" dirty="0" err="1"/>
-            <a:t>viernes</a:t>
-          </a:r>
-          <a:endParaRPr lang="en-US" sz="2800" dirty="0"/>
         </a:p>
       </dgm:t>
     </dgm:pt>
@@ -7149,7 +7129,7 @@
         <a:bodyPr/>
         <a:lstStyle/>
         <a:p>
-          <a:endParaRPr lang="en-US" sz="2400"/>
+          <a:endParaRPr lang="es-ES_tradnl" sz="2400" dirty="0"/>
         </a:p>
       </dgm:t>
     </dgm:pt>
@@ -7160,7 +7140,7 @@
         <a:bodyPr/>
         <a:lstStyle/>
         <a:p>
-          <a:endParaRPr lang="en-US" sz="2400"/>
+          <a:endParaRPr lang="es-ES_tradnl" sz="2400" dirty="0"/>
         </a:p>
       </dgm:t>
     </dgm:pt>
@@ -7172,86 +7152,14 @@
         <a:lstStyle/>
         <a:p>
           <a:r>
-            <a:rPr lang="en-US" sz="1800" dirty="0"/>
+            <a:rPr lang="es-ES_tradnl" sz="1800" dirty="0"/>
             <a:t>Tres</a:t>
           </a:r>
           <a:r>
-            <a:rPr lang="en-US" sz="1800" baseline="0" dirty="0"/>
-            <a:t> horas de </a:t>
+            <a:rPr lang="es-ES_tradnl" sz="1800" baseline="0" dirty="0"/>
+            <a:t> horas de trabajo independiente para avanzar en las actividades asignadas el martes (asesorías incluidas)</a:t>
           </a:r>
-          <a:r>
-            <a:rPr lang="en-US" sz="1800" baseline="0" dirty="0" err="1"/>
-            <a:t>trabajo</a:t>
-          </a:r>
-          <a:r>
-            <a:rPr lang="en-US" sz="1800" baseline="0" dirty="0"/>
-            <a:t> </a:t>
-          </a:r>
-          <a:r>
-            <a:rPr lang="en-US" sz="1800" baseline="0" dirty="0" err="1"/>
-            <a:t>independiente</a:t>
-          </a:r>
-          <a:r>
-            <a:rPr lang="en-US" sz="1800" baseline="0" dirty="0"/>
-            <a:t> para </a:t>
-          </a:r>
-          <a:r>
-            <a:rPr lang="en-US" sz="1800" baseline="0" dirty="0" err="1"/>
-            <a:t>avanzar</a:t>
-          </a:r>
-          <a:r>
-            <a:rPr lang="en-US" sz="1800" baseline="0" dirty="0"/>
-            <a:t> </a:t>
-          </a:r>
-          <a:r>
-            <a:rPr lang="en-US" sz="1800" baseline="0" dirty="0" err="1"/>
-            <a:t>en</a:t>
-          </a:r>
-          <a:r>
-            <a:rPr lang="en-US" sz="1800" baseline="0" dirty="0"/>
-            <a:t> las </a:t>
-          </a:r>
-          <a:r>
-            <a:rPr lang="en-US" sz="1800" baseline="0" dirty="0" err="1"/>
-            <a:t>actividades</a:t>
-          </a:r>
-          <a:r>
-            <a:rPr lang="en-US" sz="1800" baseline="0" dirty="0"/>
-            <a:t> </a:t>
-          </a:r>
-          <a:r>
-            <a:rPr lang="en-US" sz="1800" baseline="0" dirty="0" err="1"/>
-            <a:t>asignadas</a:t>
-          </a:r>
-          <a:r>
-            <a:rPr lang="en-US" sz="1800" baseline="0" dirty="0"/>
-            <a:t> </a:t>
-          </a:r>
-          <a:r>
-            <a:rPr lang="en-US" sz="1800" baseline="0" dirty="0" err="1"/>
-            <a:t>el</a:t>
-          </a:r>
-          <a:r>
-            <a:rPr lang="en-US" sz="1800" baseline="0" dirty="0"/>
-            <a:t> martes (</a:t>
-          </a:r>
-          <a:r>
-            <a:rPr lang="en-US" sz="1800" baseline="0" dirty="0" err="1"/>
-            <a:t>asesorías</a:t>
-          </a:r>
-          <a:r>
-            <a:rPr lang="en-US" sz="1800" baseline="0" dirty="0"/>
-            <a:t> </a:t>
-          </a:r>
-          <a:r>
-            <a:rPr lang="en-US" sz="1800" baseline="0" dirty="0" err="1"/>
-            <a:t>incluidas</a:t>
-          </a:r>
-          <a:r>
-            <a:rPr lang="en-US" sz="1800" baseline="0" dirty="0"/>
-            <a:t>)</a:t>
-          </a:r>
-          <a:endParaRPr lang="en-US" sz="1800" dirty="0"/>
+          <a:endParaRPr lang="es-ES_tradnl" sz="1800" dirty="0"/>
         </a:p>
       </dgm:t>
     </dgm:pt>
@@ -7262,7 +7170,7 @@
         <a:bodyPr/>
         <a:lstStyle/>
         <a:p>
-          <a:endParaRPr lang="en-US" sz="2400"/>
+          <a:endParaRPr lang="es-ES_tradnl" sz="2400" dirty="0"/>
         </a:p>
       </dgm:t>
     </dgm:pt>
@@ -7273,7 +7181,7 @@
         <a:bodyPr/>
         <a:lstStyle/>
         <a:p>
-          <a:endParaRPr lang="en-US" sz="2400"/>
+          <a:endParaRPr lang="es-ES_tradnl" sz="2400" dirty="0"/>
         </a:p>
       </dgm:t>
     </dgm:pt>
@@ -7288,10 +7196,9 @@
             <a:defRPr b="1"/>
           </a:pPr>
           <a:r>
-            <a:rPr lang="en-US" sz="2800" err="1"/>
+            <a:rPr lang="es-ES_tradnl" sz="2800" dirty="0"/>
             <a:t>sábado</a:t>
           </a:r>
-          <a:endParaRPr lang="en-US" sz="2800"/>
         </a:p>
       </dgm:t>
     </dgm:pt>
@@ -7302,7 +7209,7 @@
         <a:bodyPr/>
         <a:lstStyle/>
         <a:p>
-          <a:endParaRPr lang="en-US" sz="2400"/>
+          <a:endParaRPr lang="es-ES_tradnl" sz="2400" dirty="0"/>
         </a:p>
       </dgm:t>
     </dgm:pt>
@@ -7313,7 +7220,7 @@
         <a:bodyPr/>
         <a:lstStyle/>
         <a:p>
-          <a:endParaRPr lang="en-US" sz="2400"/>
+          <a:endParaRPr lang="es-ES_tradnl" sz="2400" dirty="0"/>
         </a:p>
       </dgm:t>
     </dgm:pt>
@@ -7325,78 +7232,9 @@
         <a:lstStyle/>
         <a:p>
           <a:r>
-            <a:rPr lang="en-US" sz="1800" dirty="0"/>
-            <a:t>Dos horas </a:t>
+            <a:rPr lang="es-ES_tradnl" sz="1800" dirty="0"/>
+            <a:t>Dos horas el sábado (10 a 12 p.m.) para aspectos prácticos, cerrar el tema y tópicos complementarios</a:t>
           </a:r>
-          <a:r>
-            <a:rPr lang="en-US" sz="1800" dirty="0" err="1"/>
-            <a:t>el</a:t>
-          </a:r>
-          <a:r>
-            <a:rPr lang="en-US" sz="1800" dirty="0"/>
-            <a:t> </a:t>
-          </a:r>
-          <a:r>
-            <a:rPr lang="en-US" sz="1800" dirty="0" err="1"/>
-            <a:t>sábado</a:t>
-          </a:r>
-          <a:r>
-            <a:rPr lang="en-US" sz="1800" dirty="0"/>
-            <a:t> (10 a 12 p.m.) para </a:t>
-          </a:r>
-          <a:r>
-            <a:rPr lang="en-US" sz="1800" dirty="0" err="1"/>
-            <a:t>aspectos</a:t>
-          </a:r>
-          <a:r>
-            <a:rPr lang="en-US" sz="1800" dirty="0"/>
-            <a:t> </a:t>
-          </a:r>
-          <a:r>
-            <a:rPr lang="en-US" sz="1800" dirty="0" err="1"/>
-            <a:t>prácticos</a:t>
-          </a:r>
-          <a:r>
-            <a:rPr lang="en-US" sz="1800" dirty="0"/>
-            <a:t>, </a:t>
-          </a:r>
-          <a:r>
-            <a:rPr lang="en-US" sz="1800" dirty="0" err="1"/>
-            <a:t>cerrar</a:t>
-          </a:r>
-          <a:r>
-            <a:rPr lang="en-US" sz="1800" dirty="0"/>
-            <a:t> </a:t>
-          </a:r>
-          <a:r>
-            <a:rPr lang="en-US" sz="1800" dirty="0" err="1"/>
-            <a:t>el</a:t>
-          </a:r>
-          <a:r>
-            <a:rPr lang="en-US" sz="1800" dirty="0"/>
-            <a:t> </a:t>
-          </a:r>
-          <a:r>
-            <a:rPr lang="en-US" sz="1800" dirty="0" err="1"/>
-            <a:t>tema</a:t>
-          </a:r>
-          <a:r>
-            <a:rPr lang="en-US" sz="1800" dirty="0"/>
-            <a:t> y </a:t>
-          </a:r>
-          <a:r>
-            <a:rPr lang="en-US" sz="1800" dirty="0" err="1"/>
-            <a:t>tópicos</a:t>
-          </a:r>
-          <a:r>
-            <a:rPr lang="en-US" sz="1800" dirty="0"/>
-            <a:t> </a:t>
-          </a:r>
-          <a:r>
-            <a:rPr lang="en-US" sz="1800" dirty="0" err="1"/>
-            <a:t>complementarios</a:t>
-          </a:r>
-          <a:endParaRPr lang="en-US" sz="1800" dirty="0"/>
         </a:p>
       </dgm:t>
     </dgm:pt>
@@ -7407,7 +7245,7 @@
         <a:bodyPr/>
         <a:lstStyle/>
         <a:p>
-          <a:endParaRPr lang="en-US" sz="2400"/>
+          <a:endParaRPr lang="es-ES_tradnl" sz="2400" dirty="0"/>
         </a:p>
       </dgm:t>
     </dgm:pt>
@@ -7418,7 +7256,7 @@
         <a:bodyPr/>
         <a:lstStyle/>
         <a:p>
-          <a:endParaRPr lang="en-US" sz="2400"/>
+          <a:endParaRPr lang="es-ES_tradnl" sz="2400" dirty="0"/>
         </a:p>
       </dgm:t>
     </dgm:pt>
@@ -7837,22 +7675,8 @@
         <a:lstStyle/>
         <a:p>
           <a:r>
-            <a:rPr lang="es-MX"/>
-            <a:t>Datos crudos </a:t>
-          </a:r>
-        </a:p>
-        <a:p>
-          <a:r>
-            <a:rPr lang="es-MX"/>
-            <a:t>(</a:t>
-          </a:r>
-          <a:r>
-            <a:rPr lang="es-MX" i="1"/>
-            <a:t>raw data</a:t>
-          </a:r>
-          <a:r>
-            <a:rPr lang="es-MX"/>
-            <a:t>)</a:t>
+            <a:rPr lang="es-MX" dirty="0"/>
+            <a:t>Ingesta de datos</a:t>
           </a:r>
         </a:p>
       </dgm:t>
@@ -7887,21 +7711,21 @@
         <a:lstStyle/>
         <a:p>
           <a:r>
-            <a:rPr lang="es-MX"/>
+            <a:rPr lang="es-MX" dirty="0"/>
             <a:t>Procesamiento de datos </a:t>
           </a:r>
         </a:p>
         <a:p>
           <a:r>
-            <a:rPr lang="es-MX"/>
+            <a:rPr lang="es-MX" dirty="0"/>
             <a:t>(</a:t>
           </a:r>
           <a:r>
-            <a:rPr lang="es-MX" i="1"/>
+            <a:rPr lang="es-MX" i="1" dirty="0"/>
             <a:t>data wrangling</a:t>
           </a:r>
           <a:r>
-            <a:rPr lang="es-MX"/>
+            <a:rPr lang="es-MX" dirty="0"/>
             <a:t>)</a:t>
           </a:r>
         </a:p>
@@ -8023,6 +7847,42 @@
         </a:p>
       </dgm:t>
     </dgm:pt>
+    <dgm:pt modelId="{5080258A-22F8-264E-AB9C-75001ABA676D}">
+      <dgm:prSet/>
+      <dgm:spPr/>
+      <dgm:t>
+        <a:bodyPr/>
+        <a:lstStyle/>
+        <a:p>
+          <a:r>
+            <a:rPr lang="es-MX" dirty="0"/>
+            <a:t>Contar historias con datos (data storytelling)</a:t>
+          </a:r>
+        </a:p>
+      </dgm:t>
+    </dgm:pt>
+    <dgm:pt modelId="{C5706C04-AFB3-C148-BB97-DCA81CC3376F}" type="parTrans" cxnId="{7BDCBE65-D0FF-1440-84C8-A4F644E31213}">
+      <dgm:prSet/>
+      <dgm:spPr/>
+      <dgm:t>
+        <a:bodyPr/>
+        <a:lstStyle/>
+        <a:p>
+          <a:endParaRPr lang="es-MX"/>
+        </a:p>
+      </dgm:t>
+    </dgm:pt>
+    <dgm:pt modelId="{CD92DB19-4270-664C-ABBA-2752DDC529D7}" type="sibTrans" cxnId="{7BDCBE65-D0FF-1440-84C8-A4F644E31213}">
+      <dgm:prSet/>
+      <dgm:spPr/>
+      <dgm:t>
+        <a:bodyPr/>
+        <a:lstStyle/>
+        <a:p>
+          <a:endParaRPr lang="es-MX"/>
+        </a:p>
+      </dgm:t>
+    </dgm:pt>
     <dgm:pt modelId="{A79518E4-CFC2-254F-A33A-7885256379BF}" type="pres">
       <dgm:prSet presAssocID="{53E94030-64DC-A543-8013-8674BAF21EC6}" presName="Name0" presStyleCnt="0">
         <dgm:presLayoutVars>
@@ -8033,7 +7893,7 @@
       <dgm:spPr/>
     </dgm:pt>
     <dgm:pt modelId="{A2AFD630-2C47-9147-8A22-DE2A6A776154}" type="pres">
-      <dgm:prSet presAssocID="{043D3C1D-4CFC-8C48-8003-E6DA76EE25ED}" presName="parTxOnly" presStyleLbl="node1" presStyleIdx="0" presStyleCnt="4">
+      <dgm:prSet presAssocID="{043D3C1D-4CFC-8C48-8003-E6DA76EE25ED}" presName="parTxOnly" presStyleLbl="node1" presStyleIdx="0" presStyleCnt="5">
         <dgm:presLayoutVars>
           <dgm:bulletEnabled val="1"/>
         </dgm:presLayoutVars>
@@ -8044,8 +7904,20 @@
       <dgm:prSet presAssocID="{970B993A-8FFB-4041-BA8B-D076DA18CAB0}" presName="parSpace" presStyleCnt="0"/>
       <dgm:spPr/>
     </dgm:pt>
+    <dgm:pt modelId="{01347A67-ACDD-1A46-AFF9-F0FD15C8F748}" type="pres">
+      <dgm:prSet presAssocID="{FDB4A59A-509F-2446-B930-18E2EF450555}" presName="parTxOnly" presStyleLbl="node1" presStyleIdx="1" presStyleCnt="5">
+        <dgm:presLayoutVars>
+          <dgm:bulletEnabled val="1"/>
+        </dgm:presLayoutVars>
+      </dgm:prSet>
+      <dgm:spPr/>
+    </dgm:pt>
+    <dgm:pt modelId="{DDF02ADD-AC54-174A-892B-E623AD736361}" type="pres">
+      <dgm:prSet presAssocID="{E9B89FFD-29FA-E04E-A61F-E4CF39D3B50E}" presName="parSpace" presStyleCnt="0"/>
+      <dgm:spPr/>
+    </dgm:pt>
     <dgm:pt modelId="{F699923F-A2DB-9343-BB19-B8EC10F41FFC}" type="pres">
-      <dgm:prSet presAssocID="{147EB4E5-88FF-E448-B52D-E35EB1D675DC}" presName="parTxOnly" presStyleLbl="node1" presStyleIdx="1" presStyleCnt="4">
+      <dgm:prSet presAssocID="{147EB4E5-88FF-E448-B52D-E35EB1D675DC}" presName="parTxOnly" presStyleLbl="node1" presStyleIdx="2" presStyleCnt="5">
         <dgm:presLayoutVars>
           <dgm:bulletEnabled val="1"/>
         </dgm:presLayoutVars>
@@ -8056,20 +7928,20 @@
       <dgm:prSet presAssocID="{CC81C15F-F82D-FB4B-8426-A81C71369AA1}" presName="parSpace" presStyleCnt="0"/>
       <dgm:spPr/>
     </dgm:pt>
-    <dgm:pt modelId="{01347A67-ACDD-1A46-AFF9-F0FD15C8F748}" type="pres">
-      <dgm:prSet presAssocID="{FDB4A59A-509F-2446-B930-18E2EF450555}" presName="parTxOnly" presStyleLbl="node1" presStyleIdx="2" presStyleCnt="4">
+    <dgm:pt modelId="{FA3047BF-3EDC-BB42-BCAE-F8EE3F669A17}" type="pres">
+      <dgm:prSet presAssocID="{B72B6E46-BB9D-824B-867F-D3C8EF39FF33}" presName="parTxOnly" presStyleLbl="node1" presStyleIdx="3" presStyleCnt="5">
         <dgm:presLayoutVars>
           <dgm:bulletEnabled val="1"/>
         </dgm:presLayoutVars>
       </dgm:prSet>
       <dgm:spPr/>
     </dgm:pt>
-    <dgm:pt modelId="{DDF02ADD-AC54-174A-892B-E623AD736361}" type="pres">
-      <dgm:prSet presAssocID="{E9B89FFD-29FA-E04E-A61F-E4CF39D3B50E}" presName="parSpace" presStyleCnt="0"/>
+    <dgm:pt modelId="{363CD3C2-DF2C-FE44-9427-DE19D9E98A6E}" type="pres">
+      <dgm:prSet presAssocID="{52060103-3701-AD4D-9B88-EF0F2138E98B}" presName="parSpace" presStyleCnt="0"/>
       <dgm:spPr/>
     </dgm:pt>
-    <dgm:pt modelId="{FA3047BF-3EDC-BB42-BCAE-F8EE3F669A17}" type="pres">
-      <dgm:prSet presAssocID="{B72B6E46-BB9D-824B-867F-D3C8EF39FF33}" presName="parTxOnly" presStyleLbl="node1" presStyleIdx="3" presStyleCnt="4">
+    <dgm:pt modelId="{C6C7D529-AB3F-8947-9ED2-836264D4340E}" type="pres">
+      <dgm:prSet presAssocID="{5080258A-22F8-264E-AB9C-75001ABA676D}" presName="parTxOnly" presStyleLbl="node1" presStyleIdx="4" presStyleCnt="5">
         <dgm:presLayoutVars>
           <dgm:bulletEnabled val="1"/>
         </dgm:presLayoutVars>
@@ -8078,22 +7950,26 @@
     </dgm:pt>
   </dgm:ptLst>
   <dgm:cxnLst>
-    <dgm:cxn modelId="{752F151F-9DE5-0049-9CD8-0AF699F7FB90}" type="presOf" srcId="{B72B6E46-BB9D-824B-867F-D3C8EF39FF33}" destId="{FA3047BF-3EDC-BB42-BCAE-F8EE3F669A17}" srcOrd="0" destOrd="0" presId="urn:microsoft.com/office/officeart/2005/8/layout/hChevron3"/>
-    <dgm:cxn modelId="{1CB9162A-C4A4-D341-ABD4-0747453E5472}" type="presOf" srcId="{043D3C1D-4CFC-8C48-8003-E6DA76EE25ED}" destId="{A2AFD630-2C47-9147-8A22-DE2A6A776154}" srcOrd="0" destOrd="0" presId="urn:microsoft.com/office/officeart/2005/8/layout/hChevron3"/>
-    <dgm:cxn modelId="{2E8A923C-1E4D-B143-AA95-7813B0B3650A}" type="presOf" srcId="{147EB4E5-88FF-E448-B52D-E35EB1D675DC}" destId="{F699923F-A2DB-9343-BB19-B8EC10F41FFC}" srcOrd="0" destOrd="0" presId="urn:microsoft.com/office/officeart/2005/8/layout/hChevron3"/>
+    <dgm:cxn modelId="{23FF9E2F-528E-F247-966E-0865E3EBC479}" type="presOf" srcId="{147EB4E5-88FF-E448-B52D-E35EB1D675DC}" destId="{F699923F-A2DB-9343-BB19-B8EC10F41FFC}" srcOrd="0" destOrd="0" presId="urn:microsoft.com/office/officeart/2005/8/layout/hChevron3"/>
     <dgm:cxn modelId="{1385CE61-6D03-E643-BDDE-3BD0BADFEE8F}" type="presOf" srcId="{53E94030-64DC-A543-8013-8674BAF21EC6}" destId="{A79518E4-CFC2-254F-A33A-7885256379BF}" srcOrd="0" destOrd="0" presId="urn:microsoft.com/office/officeart/2005/8/layout/hChevron3"/>
+    <dgm:cxn modelId="{7BDCBE65-D0FF-1440-84C8-A4F644E31213}" srcId="{53E94030-64DC-A543-8013-8674BAF21EC6}" destId="{5080258A-22F8-264E-AB9C-75001ABA676D}" srcOrd="4" destOrd="0" parTransId="{C5706C04-AFB3-C148-BB97-DCA81CC3376F}" sibTransId="{CD92DB19-4270-664C-ABBA-2752DDC529D7}"/>
+    <dgm:cxn modelId="{C7394184-9E0B-DB41-B1A9-AFA46415D37B}" type="presOf" srcId="{FDB4A59A-509F-2446-B930-18E2EF450555}" destId="{01347A67-ACDD-1A46-AFF9-F0FD15C8F748}" srcOrd="0" destOrd="0" presId="urn:microsoft.com/office/officeart/2005/8/layout/hChevron3"/>
     <dgm:cxn modelId="{037A2093-D3BF-BD45-B684-9E74EE9842BA}" srcId="{53E94030-64DC-A543-8013-8674BAF21EC6}" destId="{043D3C1D-4CFC-8C48-8003-E6DA76EE25ED}" srcOrd="0" destOrd="0" parTransId="{4099FB5A-A34D-8645-B5F2-FF3B1895E918}" sibTransId="{970B993A-8FFB-4041-BA8B-D076DA18CAB0}"/>
-    <dgm:cxn modelId="{A4C56A9E-15AF-F44B-9EF4-99C5719DE722}" srcId="{53E94030-64DC-A543-8013-8674BAF21EC6}" destId="{FDB4A59A-509F-2446-B930-18E2EF450555}" srcOrd="2" destOrd="0" parTransId="{7FC6AA80-F8D8-B345-9DA3-4738F1E4266A}" sibTransId="{E9B89FFD-29FA-E04E-A61F-E4CF39D3B50E}"/>
+    <dgm:cxn modelId="{A4C56A9E-15AF-F44B-9EF4-99C5719DE722}" srcId="{53E94030-64DC-A543-8013-8674BAF21EC6}" destId="{FDB4A59A-509F-2446-B930-18E2EF450555}" srcOrd="1" destOrd="0" parTransId="{7FC6AA80-F8D8-B345-9DA3-4738F1E4266A}" sibTransId="{E9B89FFD-29FA-E04E-A61F-E4CF39D3B50E}"/>
+    <dgm:cxn modelId="{8DD090A3-AA88-E145-A81B-8A91B69BEF5B}" type="presOf" srcId="{5080258A-22F8-264E-AB9C-75001ABA676D}" destId="{C6C7D529-AB3F-8947-9ED2-836264D4340E}" srcOrd="0" destOrd="0" presId="urn:microsoft.com/office/officeart/2005/8/layout/hChevron3"/>
+    <dgm:cxn modelId="{575CEAB3-AE7B-574C-A1E0-5A1ABCF61854}" type="presOf" srcId="{043D3C1D-4CFC-8C48-8003-E6DA76EE25ED}" destId="{A2AFD630-2C47-9147-8A22-DE2A6A776154}" srcOrd="0" destOrd="0" presId="urn:microsoft.com/office/officeart/2005/8/layout/hChevron3"/>
     <dgm:cxn modelId="{CBF9BFB8-1164-C84E-9F60-E406A3CDD5F2}" srcId="{53E94030-64DC-A543-8013-8674BAF21EC6}" destId="{B72B6E46-BB9D-824B-867F-D3C8EF39FF33}" srcOrd="3" destOrd="0" parTransId="{030A033B-0229-C643-A2B2-B54995D92CDE}" sibTransId="{52060103-3701-AD4D-9B88-EF0F2138E98B}"/>
-    <dgm:cxn modelId="{4DFEBEEF-EAC3-6A4F-93A3-D7A5B1A0B6ED}" srcId="{53E94030-64DC-A543-8013-8674BAF21EC6}" destId="{147EB4E5-88FF-E448-B52D-E35EB1D675DC}" srcOrd="1" destOrd="0" parTransId="{F6EFA819-D6A0-3444-96A0-F3DE7F2E0511}" sibTransId="{CC81C15F-F82D-FB4B-8426-A81C71369AA1}"/>
-    <dgm:cxn modelId="{37E23DF5-3439-BE49-B393-60B467717B6D}" type="presOf" srcId="{FDB4A59A-509F-2446-B930-18E2EF450555}" destId="{01347A67-ACDD-1A46-AFF9-F0FD15C8F748}" srcOrd="0" destOrd="0" presId="urn:microsoft.com/office/officeart/2005/8/layout/hChevron3"/>
-    <dgm:cxn modelId="{0BD6FB59-BBC2-CB43-A0BA-EB7E0F4DA14F}" type="presParOf" srcId="{A79518E4-CFC2-254F-A33A-7885256379BF}" destId="{A2AFD630-2C47-9147-8A22-DE2A6A776154}" srcOrd="0" destOrd="0" presId="urn:microsoft.com/office/officeart/2005/8/layout/hChevron3"/>
-    <dgm:cxn modelId="{EB538CA0-FB48-4942-8E2A-667A42F88CE4}" type="presParOf" srcId="{A79518E4-CFC2-254F-A33A-7885256379BF}" destId="{77C63660-1504-404A-A17C-13245143B4C7}" srcOrd="1" destOrd="0" presId="urn:microsoft.com/office/officeart/2005/8/layout/hChevron3"/>
-    <dgm:cxn modelId="{BC62D97C-0B09-CD40-B0B1-2E9FA6603F65}" type="presParOf" srcId="{A79518E4-CFC2-254F-A33A-7885256379BF}" destId="{F699923F-A2DB-9343-BB19-B8EC10F41FFC}" srcOrd="2" destOrd="0" presId="urn:microsoft.com/office/officeart/2005/8/layout/hChevron3"/>
-    <dgm:cxn modelId="{B20B27A9-597D-8A4C-B82B-D8F7FFC7FB1C}" type="presParOf" srcId="{A79518E4-CFC2-254F-A33A-7885256379BF}" destId="{60DB6E06-C81B-B743-AEF9-694BC5F03945}" srcOrd="3" destOrd="0" presId="urn:microsoft.com/office/officeart/2005/8/layout/hChevron3"/>
-    <dgm:cxn modelId="{FE0B7EB2-1ECB-8C49-B028-41CBEE05A1EE}" type="presParOf" srcId="{A79518E4-CFC2-254F-A33A-7885256379BF}" destId="{01347A67-ACDD-1A46-AFF9-F0FD15C8F748}" srcOrd="4" destOrd="0" presId="urn:microsoft.com/office/officeart/2005/8/layout/hChevron3"/>
-    <dgm:cxn modelId="{59600931-7030-514C-8747-8E5FFA2CFD71}" type="presParOf" srcId="{A79518E4-CFC2-254F-A33A-7885256379BF}" destId="{DDF02ADD-AC54-174A-892B-E623AD736361}" srcOrd="5" destOrd="0" presId="urn:microsoft.com/office/officeart/2005/8/layout/hChevron3"/>
-    <dgm:cxn modelId="{D3E3B245-A838-7644-91E9-7C06FBD83F64}" type="presParOf" srcId="{A79518E4-CFC2-254F-A33A-7885256379BF}" destId="{FA3047BF-3EDC-BB42-BCAE-F8EE3F669A17}" srcOrd="6" destOrd="0" presId="urn:microsoft.com/office/officeart/2005/8/layout/hChevron3"/>
+    <dgm:cxn modelId="{0977F3B9-23A2-B542-B215-034F4099A7BF}" type="presOf" srcId="{B72B6E46-BB9D-824B-867F-D3C8EF39FF33}" destId="{FA3047BF-3EDC-BB42-BCAE-F8EE3F669A17}" srcOrd="0" destOrd="0" presId="urn:microsoft.com/office/officeart/2005/8/layout/hChevron3"/>
+    <dgm:cxn modelId="{4DFEBEEF-EAC3-6A4F-93A3-D7A5B1A0B6ED}" srcId="{53E94030-64DC-A543-8013-8674BAF21EC6}" destId="{147EB4E5-88FF-E448-B52D-E35EB1D675DC}" srcOrd="2" destOrd="0" parTransId="{F6EFA819-D6A0-3444-96A0-F3DE7F2E0511}" sibTransId="{CC81C15F-F82D-FB4B-8426-A81C71369AA1}"/>
+    <dgm:cxn modelId="{ABD876D4-7814-D041-811A-4F6FAC9DC968}" type="presParOf" srcId="{A79518E4-CFC2-254F-A33A-7885256379BF}" destId="{A2AFD630-2C47-9147-8A22-DE2A6A776154}" srcOrd="0" destOrd="0" presId="urn:microsoft.com/office/officeart/2005/8/layout/hChevron3"/>
+    <dgm:cxn modelId="{0A24DBE1-F8C7-B845-BB3A-592C12EF7C8F}" type="presParOf" srcId="{A79518E4-CFC2-254F-A33A-7885256379BF}" destId="{77C63660-1504-404A-A17C-13245143B4C7}" srcOrd="1" destOrd="0" presId="urn:microsoft.com/office/officeart/2005/8/layout/hChevron3"/>
+    <dgm:cxn modelId="{DD4D441E-3C04-774D-8E33-730381CED608}" type="presParOf" srcId="{A79518E4-CFC2-254F-A33A-7885256379BF}" destId="{01347A67-ACDD-1A46-AFF9-F0FD15C8F748}" srcOrd="2" destOrd="0" presId="urn:microsoft.com/office/officeart/2005/8/layout/hChevron3"/>
+    <dgm:cxn modelId="{70410EAE-7CB1-6B4C-A761-AF25684F6992}" type="presParOf" srcId="{A79518E4-CFC2-254F-A33A-7885256379BF}" destId="{DDF02ADD-AC54-174A-892B-E623AD736361}" srcOrd="3" destOrd="0" presId="urn:microsoft.com/office/officeart/2005/8/layout/hChevron3"/>
+    <dgm:cxn modelId="{E444E024-1A8D-1543-9E19-6B860B41602A}" type="presParOf" srcId="{A79518E4-CFC2-254F-A33A-7885256379BF}" destId="{F699923F-A2DB-9343-BB19-B8EC10F41FFC}" srcOrd="4" destOrd="0" presId="urn:microsoft.com/office/officeart/2005/8/layout/hChevron3"/>
+    <dgm:cxn modelId="{1FD2B09C-1399-F149-ADCE-CB9098A09EDB}" type="presParOf" srcId="{A79518E4-CFC2-254F-A33A-7885256379BF}" destId="{60DB6E06-C81B-B743-AEF9-694BC5F03945}" srcOrd="5" destOrd="0" presId="urn:microsoft.com/office/officeart/2005/8/layout/hChevron3"/>
+    <dgm:cxn modelId="{3081626A-5FD9-BA40-9F9E-2A12A11B01D2}" type="presParOf" srcId="{A79518E4-CFC2-254F-A33A-7885256379BF}" destId="{FA3047BF-3EDC-BB42-BCAE-F8EE3F669A17}" srcOrd="6" destOrd="0" presId="urn:microsoft.com/office/officeart/2005/8/layout/hChevron3"/>
+    <dgm:cxn modelId="{52861CFA-6369-A648-A1FC-938589086D2A}" type="presParOf" srcId="{A79518E4-CFC2-254F-A33A-7885256379BF}" destId="{363CD3C2-DF2C-FE44-9427-DE19D9E98A6E}" srcOrd="7" destOrd="0" presId="urn:microsoft.com/office/officeart/2005/8/layout/hChevron3"/>
+    <dgm:cxn modelId="{6C3B70D3-B2E9-8741-B157-86A62F1D6689}" type="presParOf" srcId="{A79518E4-CFC2-254F-A33A-7885256379BF}" destId="{C6C7D529-AB3F-8947-9ED2-836264D4340E}" srcOrd="8" destOrd="0" presId="urn:microsoft.com/office/officeart/2005/8/layout/hChevron3"/>
   </dgm:cxnLst>
   <dgm:bg/>
   <dgm:whole/>
@@ -10178,22 +10054,9 @@
             <a:buNone/>
           </a:pPr>
           <a:r>
-            <a:rPr lang="en-US" sz="1800" kern="1200" dirty="0"/>
-            <a:t>Dos horas el martes (6 a 8 p.m.) con el </a:t>
+            <a:rPr lang="es-ES_tradnl" sz="1800" kern="1200" dirty="0"/>
+            <a:t>Dos horas el martes (6 a 8 p.m.) con el tema nuevo de la semana</a:t>
           </a:r>
-          <a:r>
-            <a:rPr lang="en-US" sz="1800" kern="1200" dirty="0" err="1"/>
-            <a:t>tema</a:t>
-          </a:r>
-          <a:r>
-            <a:rPr lang="en-US" sz="1800" kern="1200" dirty="0"/>
-            <a:t> nuevo de la </a:t>
-          </a:r>
-          <a:r>
-            <a:rPr lang="en-US" sz="1800" kern="1200" dirty="0" err="1"/>
-            <a:t>semana</a:t>
-          </a:r>
-          <a:endParaRPr lang="en-US" sz="1800" kern="1200" dirty="0"/>
         </a:p>
       </dsp:txBody>
       <dsp:txXfrm>
@@ -10252,7 +10115,7 @@
             <a:defRPr b="1"/>
           </a:pPr>
           <a:r>
-            <a:rPr lang="en-US" sz="2800" kern="1200"/>
+            <a:rPr lang="es-ES_tradnl" sz="2800" kern="1200" dirty="0"/>
             <a:t>martes</a:t>
           </a:r>
         </a:p>
@@ -10493,86 +10356,14 @@
             <a:buNone/>
           </a:pPr>
           <a:r>
-            <a:rPr lang="en-US" sz="1800" kern="1200" dirty="0"/>
+            <a:rPr lang="es-ES_tradnl" sz="1800" kern="1200" dirty="0"/>
             <a:t>Tres</a:t>
           </a:r>
           <a:r>
-            <a:rPr lang="en-US" sz="1800" kern="1200" baseline="0" dirty="0"/>
-            <a:t> horas de </a:t>
+            <a:rPr lang="es-ES_tradnl" sz="1800" kern="1200" baseline="0" dirty="0"/>
+            <a:t> horas de trabajo independiente para avanzar en las actividades asignadas el martes (asesorías incluidas)</a:t>
           </a:r>
-          <a:r>
-            <a:rPr lang="en-US" sz="1800" kern="1200" baseline="0" dirty="0" err="1"/>
-            <a:t>trabajo</a:t>
-          </a:r>
-          <a:r>
-            <a:rPr lang="en-US" sz="1800" kern="1200" baseline="0" dirty="0"/>
-            <a:t> </a:t>
-          </a:r>
-          <a:r>
-            <a:rPr lang="en-US" sz="1800" kern="1200" baseline="0" dirty="0" err="1"/>
-            <a:t>independiente</a:t>
-          </a:r>
-          <a:r>
-            <a:rPr lang="en-US" sz="1800" kern="1200" baseline="0" dirty="0"/>
-            <a:t> para </a:t>
-          </a:r>
-          <a:r>
-            <a:rPr lang="en-US" sz="1800" kern="1200" baseline="0" dirty="0" err="1"/>
-            <a:t>avanzar</a:t>
-          </a:r>
-          <a:r>
-            <a:rPr lang="en-US" sz="1800" kern="1200" baseline="0" dirty="0"/>
-            <a:t> </a:t>
-          </a:r>
-          <a:r>
-            <a:rPr lang="en-US" sz="1800" kern="1200" baseline="0" dirty="0" err="1"/>
-            <a:t>en</a:t>
-          </a:r>
-          <a:r>
-            <a:rPr lang="en-US" sz="1800" kern="1200" baseline="0" dirty="0"/>
-            <a:t> las </a:t>
-          </a:r>
-          <a:r>
-            <a:rPr lang="en-US" sz="1800" kern="1200" baseline="0" dirty="0" err="1"/>
-            <a:t>actividades</a:t>
-          </a:r>
-          <a:r>
-            <a:rPr lang="en-US" sz="1800" kern="1200" baseline="0" dirty="0"/>
-            <a:t> </a:t>
-          </a:r>
-          <a:r>
-            <a:rPr lang="en-US" sz="1800" kern="1200" baseline="0" dirty="0" err="1"/>
-            <a:t>asignadas</a:t>
-          </a:r>
-          <a:r>
-            <a:rPr lang="en-US" sz="1800" kern="1200" baseline="0" dirty="0"/>
-            <a:t> </a:t>
-          </a:r>
-          <a:r>
-            <a:rPr lang="en-US" sz="1800" kern="1200" baseline="0" dirty="0" err="1"/>
-            <a:t>el</a:t>
-          </a:r>
-          <a:r>
-            <a:rPr lang="en-US" sz="1800" kern="1200" baseline="0" dirty="0"/>
-            <a:t> martes (</a:t>
-          </a:r>
-          <a:r>
-            <a:rPr lang="en-US" sz="1800" kern="1200" baseline="0" dirty="0" err="1"/>
-            <a:t>asesorías</a:t>
-          </a:r>
-          <a:r>
-            <a:rPr lang="en-US" sz="1800" kern="1200" baseline="0" dirty="0"/>
-            <a:t> </a:t>
-          </a:r>
-          <a:r>
-            <a:rPr lang="en-US" sz="1800" kern="1200" baseline="0" dirty="0" err="1"/>
-            <a:t>incluidas</a:t>
-          </a:r>
-          <a:r>
-            <a:rPr lang="en-US" sz="1800" kern="1200" baseline="0" dirty="0"/>
-            <a:t>)</a:t>
-          </a:r>
-          <a:endParaRPr lang="en-US" sz="1800" kern="1200" dirty="0"/>
+          <a:endParaRPr lang="es-ES_tradnl" sz="1800" kern="1200" dirty="0"/>
         </a:p>
       </dsp:txBody>
       <dsp:txXfrm>
@@ -10631,18 +10422,9 @@
             <a:defRPr b="1"/>
           </a:pPr>
           <a:r>
-            <a:rPr lang="en-US" sz="2800" kern="1200" dirty="0" err="1"/>
-            <a:t>jueves</a:t>
+            <a:rPr lang="es-ES_tradnl" sz="2800" kern="1200" dirty="0"/>
+            <a:t>jueves y viernes</a:t>
           </a:r>
-          <a:r>
-            <a:rPr lang="en-US" sz="2800" kern="1200" dirty="0"/>
-            <a:t> y </a:t>
-          </a:r>
-          <a:r>
-            <a:rPr lang="en-US" sz="2800" kern="1200" dirty="0" err="1"/>
-            <a:t>viernes</a:t>
-          </a:r>
-          <a:endParaRPr lang="en-US" sz="2800" kern="1200" dirty="0"/>
         </a:p>
       </dsp:txBody>
       <dsp:txXfrm>
@@ -10881,78 +10663,9 @@
             <a:buNone/>
           </a:pPr>
           <a:r>
-            <a:rPr lang="en-US" sz="1800" kern="1200" dirty="0"/>
-            <a:t>Dos horas </a:t>
+            <a:rPr lang="es-ES_tradnl" sz="1800" kern="1200" dirty="0"/>
+            <a:t>Dos horas el sábado (10 a 12 p.m.) para aspectos prácticos, cerrar el tema y tópicos complementarios</a:t>
           </a:r>
-          <a:r>
-            <a:rPr lang="en-US" sz="1800" kern="1200" dirty="0" err="1"/>
-            <a:t>el</a:t>
-          </a:r>
-          <a:r>
-            <a:rPr lang="en-US" sz="1800" kern="1200" dirty="0"/>
-            <a:t> </a:t>
-          </a:r>
-          <a:r>
-            <a:rPr lang="en-US" sz="1800" kern="1200" dirty="0" err="1"/>
-            <a:t>sábado</a:t>
-          </a:r>
-          <a:r>
-            <a:rPr lang="en-US" sz="1800" kern="1200" dirty="0"/>
-            <a:t> (10 a 12 p.m.) para </a:t>
-          </a:r>
-          <a:r>
-            <a:rPr lang="en-US" sz="1800" kern="1200" dirty="0" err="1"/>
-            <a:t>aspectos</a:t>
-          </a:r>
-          <a:r>
-            <a:rPr lang="en-US" sz="1800" kern="1200" dirty="0"/>
-            <a:t> </a:t>
-          </a:r>
-          <a:r>
-            <a:rPr lang="en-US" sz="1800" kern="1200" dirty="0" err="1"/>
-            <a:t>prácticos</a:t>
-          </a:r>
-          <a:r>
-            <a:rPr lang="en-US" sz="1800" kern="1200" dirty="0"/>
-            <a:t>, </a:t>
-          </a:r>
-          <a:r>
-            <a:rPr lang="en-US" sz="1800" kern="1200" dirty="0" err="1"/>
-            <a:t>cerrar</a:t>
-          </a:r>
-          <a:r>
-            <a:rPr lang="en-US" sz="1800" kern="1200" dirty="0"/>
-            <a:t> </a:t>
-          </a:r>
-          <a:r>
-            <a:rPr lang="en-US" sz="1800" kern="1200" dirty="0" err="1"/>
-            <a:t>el</a:t>
-          </a:r>
-          <a:r>
-            <a:rPr lang="en-US" sz="1800" kern="1200" dirty="0"/>
-            <a:t> </a:t>
-          </a:r>
-          <a:r>
-            <a:rPr lang="en-US" sz="1800" kern="1200" dirty="0" err="1"/>
-            <a:t>tema</a:t>
-          </a:r>
-          <a:r>
-            <a:rPr lang="en-US" sz="1800" kern="1200" dirty="0"/>
-            <a:t> y </a:t>
-          </a:r>
-          <a:r>
-            <a:rPr lang="en-US" sz="1800" kern="1200" dirty="0" err="1"/>
-            <a:t>tópicos</a:t>
-          </a:r>
-          <a:r>
-            <a:rPr lang="en-US" sz="1800" kern="1200" dirty="0"/>
-            <a:t> </a:t>
-          </a:r>
-          <a:r>
-            <a:rPr lang="en-US" sz="1800" kern="1200" dirty="0" err="1"/>
-            <a:t>complementarios</a:t>
-          </a:r>
-          <a:endParaRPr lang="en-US" sz="1800" kern="1200" dirty="0"/>
         </a:p>
       </dsp:txBody>
       <dsp:txXfrm>
@@ -11011,10 +10724,9 @@
             <a:defRPr b="1"/>
           </a:pPr>
           <a:r>
-            <a:rPr lang="en-US" sz="2800" kern="1200" err="1"/>
+            <a:rPr lang="es-ES_tradnl" sz="2800" kern="1200" dirty="0"/>
             <a:t>sábado</a:t>
           </a:r>
-          <a:endParaRPr lang="en-US" sz="2800" kern="1200"/>
         </a:p>
       </dsp:txBody>
       <dsp:txXfrm>
@@ -11130,8 +10842,8 @@
       </dsp:nvSpPr>
       <dsp:spPr>
         <a:xfrm>
-          <a:off x="3193" y="1168792"/>
-          <a:ext cx="3204144" cy="1281657"/>
+          <a:off x="1452" y="1641268"/>
+          <a:ext cx="2831986" cy="1132794"/>
         </a:xfrm>
         <a:prstGeom prst="homePlate">
           <a:avLst/>
@@ -11172,12 +10884,12 @@
         </a:fontRef>
       </dsp:style>
       <dsp:txBody>
-        <a:bodyPr spcFirstLastPara="0" vert="horz" wrap="square" lIns="106680" tIns="53340" rIns="26670" bIns="53340" numCol="1" spcCol="1270" anchor="ctr" anchorCtr="0">
+        <a:bodyPr spcFirstLastPara="0" vert="horz" wrap="square" lIns="90678" tIns="45339" rIns="22670" bIns="45339" numCol="1" spcCol="1270" anchor="ctr" anchorCtr="0">
           <a:noAutofit/>
         </a:bodyPr>
         <a:lstStyle/>
         <a:p>
-          <a:pPr marL="0" lvl="0" indent="0" algn="ctr" defTabSz="889000">
+          <a:pPr marL="0" lvl="0" indent="0" algn="ctr" defTabSz="755650">
             <a:lnSpc>
               <a:spcPct val="90000"/>
             </a:lnSpc>
@@ -11190,51 +10902,25 @@
             <a:buNone/>
           </a:pPr>
           <a:r>
-            <a:rPr lang="es-MX" sz="2000" kern="1200"/>
-            <a:t>Datos crudos </a:t>
-          </a:r>
-        </a:p>
-        <a:p>
-          <a:pPr marL="0" lvl="0" indent="0" algn="ctr" defTabSz="889000">
-            <a:lnSpc>
-              <a:spcPct val="90000"/>
-            </a:lnSpc>
-            <a:spcBef>
-              <a:spcPct val="0"/>
-            </a:spcBef>
-            <a:spcAft>
-              <a:spcPct val="35000"/>
-            </a:spcAft>
-            <a:buNone/>
-          </a:pPr>
-          <a:r>
-            <a:rPr lang="es-MX" sz="2000" kern="1200"/>
-            <a:t>(</a:t>
-          </a:r>
-          <a:r>
-            <a:rPr lang="es-MX" sz="2000" i="1" kern="1200"/>
-            <a:t>raw data</a:t>
-          </a:r>
-          <a:r>
-            <a:rPr lang="es-MX" sz="2000" kern="1200"/>
-            <a:t>)</a:t>
+            <a:rPr lang="es-MX" sz="1700" kern="1200" dirty="0"/>
+            <a:t>Ingesta de datos</a:t>
           </a:r>
         </a:p>
       </dsp:txBody>
       <dsp:txXfrm>
-        <a:off x="3193" y="1168792"/>
-        <a:ext cx="2883730" cy="1281657"/>
+        <a:off x="1452" y="1641268"/>
+        <a:ext cx="2548788" cy="1132794"/>
       </dsp:txXfrm>
     </dsp:sp>
-    <dsp:sp modelId="{F699923F-A2DB-9343-BB19-B8EC10F41FFC}">
+    <dsp:sp modelId="{01347A67-ACDD-1A46-AFF9-F0FD15C8F748}">
       <dsp:nvSpPr>
         <dsp:cNvPr id="0" name=""/>
         <dsp:cNvSpPr/>
       </dsp:nvSpPr>
       <dsp:spPr>
         <a:xfrm>
-          <a:off x="2566508" y="1168792"/>
-          <a:ext cx="3204144" cy="1281657"/>
+          <a:off x="2267041" y="1641268"/>
+          <a:ext cx="2831986" cy="1132794"/>
         </a:xfrm>
         <a:prstGeom prst="chevron">
           <a:avLst/>
@@ -11275,12 +10961,12 @@
         </a:fontRef>
       </dsp:style>
       <dsp:txBody>
-        <a:bodyPr spcFirstLastPara="0" vert="horz" wrap="square" lIns="80010" tIns="53340" rIns="26670" bIns="53340" numCol="1" spcCol="1270" anchor="ctr" anchorCtr="0">
+        <a:bodyPr spcFirstLastPara="0" vert="horz" wrap="square" lIns="68009" tIns="45339" rIns="22670" bIns="45339" numCol="1" spcCol="1270" anchor="ctr" anchorCtr="0">
           <a:noAutofit/>
         </a:bodyPr>
         <a:lstStyle/>
         <a:p>
-          <a:pPr marL="0" lvl="0" indent="0" algn="ctr" defTabSz="889000">
+          <a:pPr marL="0" lvl="0" indent="0" algn="ctr" defTabSz="755650">
             <a:lnSpc>
               <a:spcPct val="90000"/>
             </a:lnSpc>
@@ -11293,33 +10979,51 @@
             <a:buNone/>
           </a:pPr>
           <a:r>
-            <a:rPr lang="es-MX" sz="2000" kern="1200" dirty="0"/>
-            <a:t>Analisis exploratorio de datos (</a:t>
+            <a:rPr lang="es-MX" sz="1700" kern="1200" dirty="0"/>
+            <a:t>Procesamiento de datos </a:t>
+          </a:r>
+        </a:p>
+        <a:p>
+          <a:pPr marL="0" lvl="0" indent="0" algn="ctr" defTabSz="755650">
+            <a:lnSpc>
+              <a:spcPct val="90000"/>
+            </a:lnSpc>
+            <a:spcBef>
+              <a:spcPct val="0"/>
+            </a:spcBef>
+            <a:spcAft>
+              <a:spcPct val="35000"/>
+            </a:spcAft>
+            <a:buNone/>
+          </a:pPr>
+          <a:r>
+            <a:rPr lang="es-MX" sz="1700" kern="1200" dirty="0"/>
+            <a:t>(</a:t>
           </a:r>
           <a:r>
-            <a:rPr lang="es-MX" sz="2000" i="1" kern="1200" dirty="0"/>
-            <a:t>EDA</a:t>
+            <a:rPr lang="es-MX" sz="1700" i="1" kern="1200" dirty="0"/>
+            <a:t>data wrangling</a:t>
           </a:r>
           <a:r>
-            <a:rPr lang="es-MX" sz="2000" kern="1200" dirty="0"/>
+            <a:rPr lang="es-MX" sz="1700" kern="1200" dirty="0"/>
             <a:t>)</a:t>
           </a:r>
         </a:p>
       </dsp:txBody>
       <dsp:txXfrm>
-        <a:off x="3207337" y="1168792"/>
-        <a:ext cx="1922487" cy="1281657"/>
+        <a:off x="2833438" y="1641268"/>
+        <a:ext cx="1699192" cy="1132794"/>
       </dsp:txXfrm>
     </dsp:sp>
-    <dsp:sp modelId="{01347A67-ACDD-1A46-AFF9-F0FD15C8F748}">
+    <dsp:sp modelId="{F699923F-A2DB-9343-BB19-B8EC10F41FFC}">
       <dsp:nvSpPr>
         <dsp:cNvPr id="0" name=""/>
         <dsp:cNvSpPr/>
       </dsp:nvSpPr>
       <dsp:spPr>
         <a:xfrm>
-          <a:off x="5129824" y="1168792"/>
-          <a:ext cx="3204144" cy="1281657"/>
+          <a:off x="4532630" y="1641268"/>
+          <a:ext cx="2831986" cy="1132794"/>
         </a:xfrm>
         <a:prstGeom prst="chevron">
           <a:avLst/>
@@ -11360,12 +11064,12 @@
         </a:fontRef>
       </dsp:style>
       <dsp:txBody>
-        <a:bodyPr spcFirstLastPara="0" vert="horz" wrap="square" lIns="80010" tIns="53340" rIns="26670" bIns="53340" numCol="1" spcCol="1270" anchor="ctr" anchorCtr="0">
+        <a:bodyPr spcFirstLastPara="0" vert="horz" wrap="square" lIns="68009" tIns="45339" rIns="22670" bIns="45339" numCol="1" spcCol="1270" anchor="ctr" anchorCtr="0">
           <a:noAutofit/>
         </a:bodyPr>
         <a:lstStyle/>
         <a:p>
-          <a:pPr marL="0" lvl="0" indent="0" algn="ctr" defTabSz="889000">
+          <a:pPr marL="0" lvl="0" indent="0" algn="ctr" defTabSz="755650">
             <a:lnSpc>
               <a:spcPct val="90000"/>
             </a:lnSpc>
@@ -11378,40 +11082,22 @@
             <a:buNone/>
           </a:pPr>
           <a:r>
-            <a:rPr lang="es-MX" sz="2000" kern="1200"/>
-            <a:t>Procesamiento de datos </a:t>
-          </a:r>
-        </a:p>
-        <a:p>
-          <a:pPr marL="0" lvl="0" indent="0" algn="ctr" defTabSz="889000">
-            <a:lnSpc>
-              <a:spcPct val="90000"/>
-            </a:lnSpc>
-            <a:spcBef>
-              <a:spcPct val="0"/>
-            </a:spcBef>
-            <a:spcAft>
-              <a:spcPct val="35000"/>
-            </a:spcAft>
-            <a:buNone/>
-          </a:pPr>
-          <a:r>
-            <a:rPr lang="es-MX" sz="2000" kern="1200"/>
-            <a:t>(</a:t>
+            <a:rPr lang="es-MX" sz="1700" kern="1200" dirty="0"/>
+            <a:t>Analisis exploratorio de datos (</a:t>
           </a:r>
           <a:r>
-            <a:rPr lang="es-MX" sz="2000" i="1" kern="1200"/>
-            <a:t>data wrangling</a:t>
+            <a:rPr lang="es-MX" sz="1700" i="1" kern="1200" dirty="0"/>
+            <a:t>EDA</a:t>
           </a:r>
           <a:r>
-            <a:rPr lang="es-MX" sz="2000" kern="1200"/>
+            <a:rPr lang="es-MX" sz="1700" kern="1200" dirty="0"/>
             <a:t>)</a:t>
           </a:r>
         </a:p>
       </dsp:txBody>
       <dsp:txXfrm>
-        <a:off x="5770653" y="1168792"/>
-        <a:ext cx="1922487" cy="1281657"/>
+        <a:off x="5099027" y="1641268"/>
+        <a:ext cx="1699192" cy="1132794"/>
       </dsp:txXfrm>
     </dsp:sp>
     <dsp:sp modelId="{FA3047BF-3EDC-BB42-BCAE-F8EE3F669A17}">
@@ -11421,8 +11107,8 @@
       </dsp:nvSpPr>
       <dsp:spPr>
         <a:xfrm>
-          <a:off x="7693139" y="1168792"/>
-          <a:ext cx="3204144" cy="1281657"/>
+          <a:off x="6798219" y="1641268"/>
+          <a:ext cx="2831986" cy="1132794"/>
         </a:xfrm>
         <a:prstGeom prst="chevron">
           <a:avLst/>
@@ -11463,12 +11149,12 @@
         </a:fontRef>
       </dsp:style>
       <dsp:txBody>
-        <a:bodyPr spcFirstLastPara="0" vert="horz" wrap="square" lIns="80010" tIns="53340" rIns="26670" bIns="53340" numCol="1" spcCol="1270" anchor="ctr" anchorCtr="0">
+        <a:bodyPr spcFirstLastPara="0" vert="horz" wrap="square" lIns="68009" tIns="45339" rIns="22670" bIns="45339" numCol="1" spcCol="1270" anchor="ctr" anchorCtr="0">
           <a:noAutofit/>
         </a:bodyPr>
         <a:lstStyle/>
         <a:p>
-          <a:pPr marL="0" lvl="0" indent="0" algn="ctr" defTabSz="889000">
+          <a:pPr marL="0" lvl="0" indent="0" algn="ctr" defTabSz="755650">
             <a:lnSpc>
               <a:spcPct val="90000"/>
             </a:lnSpc>
@@ -11481,12 +11167,12 @@
             <a:buNone/>
           </a:pPr>
           <a:r>
-            <a:rPr lang="es-MX" sz="2000" kern="1200" dirty="0"/>
+            <a:rPr lang="es-MX" sz="1700" kern="1200" dirty="0"/>
             <a:t>Datos ordenados </a:t>
           </a:r>
         </a:p>
         <a:p>
-          <a:pPr marL="0" lvl="0" indent="0" algn="ctr" defTabSz="889000">
+          <a:pPr marL="0" lvl="0" indent="0" algn="ctr" defTabSz="755650">
             <a:lnSpc>
               <a:spcPct val="90000"/>
             </a:lnSpc>
@@ -11499,22 +11185,99 @@
             <a:buNone/>
           </a:pPr>
           <a:r>
-            <a:rPr lang="es-MX" sz="2000" kern="1200" dirty="0"/>
+            <a:rPr lang="es-MX" sz="1700" kern="1200" dirty="0"/>
             <a:t>(</a:t>
           </a:r>
           <a:r>
-            <a:rPr lang="es-MX" sz="2000" i="1" kern="1200" dirty="0"/>
+            <a:rPr lang="es-MX" sz="1700" i="1" kern="1200" dirty="0"/>
             <a:t>tidy data</a:t>
           </a:r>
           <a:r>
-            <a:rPr lang="es-MX" sz="2000" kern="1200" dirty="0"/>
+            <a:rPr lang="es-MX" sz="1700" kern="1200" dirty="0"/>
             <a:t>)</a:t>
           </a:r>
         </a:p>
       </dsp:txBody>
       <dsp:txXfrm>
-        <a:off x="8333968" y="1168792"/>
-        <a:ext cx="1922487" cy="1281657"/>
+        <a:off x="7364616" y="1641268"/>
+        <a:ext cx="1699192" cy="1132794"/>
+      </dsp:txXfrm>
+    </dsp:sp>
+    <dsp:sp modelId="{C6C7D529-AB3F-8947-9ED2-836264D4340E}">
+      <dsp:nvSpPr>
+        <dsp:cNvPr id="0" name=""/>
+        <dsp:cNvSpPr/>
+      </dsp:nvSpPr>
+      <dsp:spPr>
+        <a:xfrm>
+          <a:off x="9063809" y="1641268"/>
+          <a:ext cx="2831986" cy="1132794"/>
+        </a:xfrm>
+        <a:prstGeom prst="chevron">
+          <a:avLst/>
+        </a:prstGeom>
+        <a:solidFill>
+          <a:schemeClr val="accent2">
+            <a:hueOff val="0"/>
+            <a:satOff val="0"/>
+            <a:lumOff val="0"/>
+            <a:alphaOff val="0"/>
+          </a:schemeClr>
+        </a:solidFill>
+        <a:ln w="15875" cap="flat" cmpd="sng" algn="ctr">
+          <a:solidFill>
+            <a:schemeClr val="lt1">
+              <a:hueOff val="0"/>
+              <a:satOff val="0"/>
+              <a:lumOff val="0"/>
+              <a:alphaOff val="0"/>
+            </a:schemeClr>
+          </a:solidFill>
+          <a:prstDash val="solid"/>
+        </a:ln>
+        <a:effectLst/>
+      </dsp:spPr>
+      <dsp:style>
+        <a:lnRef idx="2">
+          <a:scrgbClr r="0" g="0" b="0"/>
+        </a:lnRef>
+        <a:fillRef idx="1">
+          <a:scrgbClr r="0" g="0" b="0"/>
+        </a:fillRef>
+        <a:effectRef idx="0">
+          <a:scrgbClr r="0" g="0" b="0"/>
+        </a:effectRef>
+        <a:fontRef idx="minor">
+          <a:schemeClr val="lt1"/>
+        </a:fontRef>
+      </dsp:style>
+      <dsp:txBody>
+        <a:bodyPr spcFirstLastPara="0" vert="horz" wrap="square" lIns="68009" tIns="45339" rIns="22670" bIns="45339" numCol="1" spcCol="1270" anchor="ctr" anchorCtr="0">
+          <a:noAutofit/>
+        </a:bodyPr>
+        <a:lstStyle/>
+        <a:p>
+          <a:pPr marL="0" lvl="0" indent="0" algn="ctr" defTabSz="755650">
+            <a:lnSpc>
+              <a:spcPct val="90000"/>
+            </a:lnSpc>
+            <a:spcBef>
+              <a:spcPct val="0"/>
+            </a:spcBef>
+            <a:spcAft>
+              <a:spcPct val="35000"/>
+            </a:spcAft>
+            <a:buNone/>
+          </a:pPr>
+          <a:r>
+            <a:rPr lang="es-MX" sz="1700" kern="1200" dirty="0"/>
+            <a:t>Contar historias con datos (data storytelling)</a:t>
+          </a:r>
+        </a:p>
+      </dsp:txBody>
+      <dsp:txXfrm>
+        <a:off x="9630206" y="1641268"/>
+        <a:ext cx="1699192" cy="1132794"/>
       </dsp:txXfrm>
     </dsp:sp>
   </dsp:spTree>
@@ -22617,7 +22380,7 @@
           <a:p>
             <a:fld id="{324A9B44-4828-EE48-BF9C-CBD1FA799CB2}" type="datetimeFigureOut">
               <a:rPr lang="es-ES_tradnl" smtClean="0"/>
-              <a:t>6/8/24</a:t>
+              <a:t>12/8/25</a:t>
             </a:fld>
             <a:endParaRPr lang="es-ES_tradnl"/>
           </a:p>
@@ -23129,7 +22892,7 @@
           <a:p>
             <a:fld id="{49D12D98-04F8-C542-A6E9-122D9DBEC8FD}" type="datetime1">
               <a:rPr lang="es-MX" smtClean="0"/>
-              <a:t>06/08/24</a:t>
+              <a:t>12/08/25</a:t>
             </a:fld>
             <a:endParaRPr lang="en-US"/>
           </a:p>
@@ -23317,7 +23080,7 @@
           <a:p>
             <a:fld id="{0A038124-6A46-A449-9989-05131BFDA31F}" type="datetime1">
               <a:rPr lang="es-MX" smtClean="0"/>
-              <a:t>06/08/24</a:t>
+              <a:t>12/08/25</a:t>
             </a:fld>
             <a:endParaRPr lang="en-US"/>
           </a:p>
@@ -23559,7 +23322,7 @@
           <a:p>
             <a:fld id="{563D23C5-55F1-8B47-AB49-A5DDC5F64A62}" type="datetime1">
               <a:rPr lang="es-MX" smtClean="0"/>
-              <a:t>06/08/24</a:t>
+              <a:t>12/08/25</a:t>
             </a:fld>
             <a:endParaRPr lang="en-US"/>
           </a:p>
@@ -23747,7 +23510,7 @@
           <a:p>
             <a:fld id="{42655641-0FAA-A646-995E-E89A531CC860}" type="datetime1">
               <a:rPr lang="es-MX" smtClean="0"/>
-              <a:t>06/08/24</a:t>
+              <a:t>12/08/25</a:t>
             </a:fld>
             <a:endParaRPr lang="en-US"/>
           </a:p>
@@ -24120,7 +23883,7 @@
           <a:p>
             <a:fld id="{E38FF827-A2F6-7F40-A0C4-D5176BE807EC}" type="datetime1">
               <a:rPr lang="es-MX" smtClean="0"/>
-              <a:t>06/08/24</a:t>
+              <a:t>12/08/25</a:t>
             </a:fld>
             <a:endParaRPr lang="en-US"/>
           </a:p>
@@ -24375,7 +24138,7 @@
           <a:p>
             <a:fld id="{6DCE5B51-294A-6040-BD86-0F3F2FE93ED7}" type="datetime1">
               <a:rPr lang="es-MX" smtClean="0"/>
-              <a:t>06/08/24</a:t>
+              <a:t>12/08/25</a:t>
             </a:fld>
             <a:endParaRPr lang="en-US"/>
           </a:p>
@@ -24772,7 +24535,7 @@
           <a:p>
             <a:fld id="{E6C14B89-0E7F-324D-9ED0-93C9CC0B2BEE}" type="datetime1">
               <a:rPr lang="es-MX" smtClean="0"/>
-              <a:t>06/08/24</a:t>
+              <a:t>12/08/25</a:t>
             </a:fld>
             <a:endParaRPr lang="en-US"/>
           </a:p>
@@ -24908,7 +24671,7 @@
           <a:p>
             <a:fld id="{12A3A656-C5B3-8C4F-901C-AC70F2A1D850}" type="datetime1">
               <a:rPr lang="es-MX" smtClean="0"/>
-              <a:t>06/08/24</a:t>
+              <a:t>12/08/25</a:t>
             </a:fld>
             <a:endParaRPr lang="en-US"/>
           </a:p>
@@ -25065,7 +24828,7 @@
           <a:p>
             <a:fld id="{DE88DC43-BF74-6A46-874A-FC88FBCA6573}" type="datetime1">
               <a:rPr lang="es-MX" smtClean="0"/>
-              <a:t>06/08/24</a:t>
+              <a:t>12/08/25</a:t>
             </a:fld>
             <a:endParaRPr lang="en-US"/>
           </a:p>
@@ -25394,7 +25157,7 @@
           <a:p>
             <a:fld id="{CA67A850-70B0-664E-9DAC-92F8E98DA82D}" type="datetime1">
               <a:rPr lang="es-MX" smtClean="0"/>
-              <a:t>06/08/24</a:t>
+              <a:t>12/08/25</a:t>
             </a:fld>
             <a:endParaRPr lang="en-US"/>
           </a:p>
@@ -25743,7 +25506,7 @@
           <a:p>
             <a:fld id="{F5DBB4EA-EB6F-944D-9298-0BE7B40FCEBE}" type="datetime1">
               <a:rPr lang="es-MX" smtClean="0"/>
-              <a:t>06/08/24</a:t>
+              <a:t>12/08/25</a:t>
             </a:fld>
             <a:endParaRPr lang="en-US"/>
           </a:p>
@@ -26004,7 +25767,7 @@
           <a:p>
             <a:fld id="{0ECAF8A3-8507-EB4A-9023-5E0BA237C12F}" type="datetime1">
               <a:rPr lang="es-MX" smtClean="0"/>
-              <a:t>06/08/24</a:t>
+              <a:t>12/08/25</a:t>
             </a:fld>
             <a:endParaRPr lang="en-US"/>
           </a:p>
@@ -26721,7 +26484,7 @@
                   <a:srgbClr val="FFFFFF"/>
                 </a:solidFill>
               </a:rPr>
-              <a:t>Semestre 2023-2</a:t>
+              <a:t>Semestre 2025-2</a:t>
             </a:r>
           </a:p>
           <a:p>
@@ -26736,7 +26499,22 @@
                   <a:srgbClr val="FFFFFF"/>
                 </a:solidFill>
               </a:rPr>
-              <a:t>Julio </a:t>
+              <a:t>	Raquel Torres </a:t>
+            </a:r>
+          </a:p>
+          <a:p>
+            <a:pPr>
+              <a:lnSpc>
+                <a:spcPct val="110000"/>
+              </a:lnSpc>
+            </a:pPr>
+            <a:r>
+              <a:rPr lang="es-ES_tradnl" sz="1400" cap="none" dirty="0">
+                <a:solidFill>
+                  <a:srgbClr val="FFFFFF"/>
+                </a:solidFill>
+              </a:rPr>
+              <a:t>	Julio </a:t>
             </a:r>
             <a:r>
               <a:rPr lang="es-ES_tradnl" sz="1400" cap="none" dirty="0" err="1">
@@ -26750,30 +26528,6 @@
               <a:solidFill>
                 <a:srgbClr val="FFFFFF"/>
               </a:solidFill>
-            </a:endParaRPr>
-          </a:p>
-          <a:p>
-            <a:pPr>
-              <a:lnSpc>
-                <a:spcPct val="110000"/>
-              </a:lnSpc>
-            </a:pPr>
-            <a:r>
-              <a:rPr lang="es-ES_tradnl" sz="1400" cap="none" dirty="0" err="1">
-                <a:solidFill>
-                  <a:srgbClr val="FFFFFF"/>
-                </a:solidFill>
-                <a:latin typeface="Courier" pitchFamily="2" charset="0"/>
-                <a:cs typeface="Cordia New" panose="020B0304020202020204" pitchFamily="34" charset="-34"/>
-              </a:rPr>
-              <a:t>julio.waissman@unison.mx</a:t>
-            </a:r>
-            <a:endParaRPr lang="es-ES_tradnl" sz="1400" cap="none" dirty="0">
-              <a:solidFill>
-                <a:srgbClr val="FFFFFF"/>
-              </a:solidFill>
-              <a:latin typeface="Courier" pitchFamily="2" charset="0"/>
-              <a:cs typeface="Cordia New" panose="020B0304020202020204" pitchFamily="34" charset="-34"/>
             </a:endParaRPr>
           </a:p>
         </p:txBody>
@@ -28155,14 +27909,14 @@
             <p:ph idx="1"/>
             <p:extLst>
               <p:ext uri="{D42A27DB-BD31-4B8C-83A1-F6EECF244321}">
-                <p14:modId xmlns:p14="http://schemas.microsoft.com/office/powerpoint/2010/main" val="2446183051"/>
+                <p14:modId xmlns:p14="http://schemas.microsoft.com/office/powerpoint/2010/main" val="1824796216"/>
               </p:ext>
             </p:extLst>
           </p:nvPr>
         </p:nvGraphicFramePr>
         <p:xfrm>
-          <a:off x="643466" y="643467"/>
-          <a:ext cx="10900477" cy="3619242"/>
+          <a:off x="170822" y="261256"/>
+          <a:ext cx="11897248" cy="4415331"/>
         </p:xfrm>
         <a:graphic>
           <a:graphicData uri="http://schemas.openxmlformats.org/drawingml/2006/diagram">
@@ -29938,15 +29692,7 @@
             </a:r>
             <a:r>
               <a:rPr lang="es-ES_tradnl" sz="2000" dirty="0"/>
-              <a:t> de </a:t>
-            </a:r>
-            <a:r>
-              <a:rPr lang="es-ES_tradnl" sz="2000" dirty="0" err="1"/>
-              <a:t>Github</a:t>
-            </a:r>
-            <a:r>
-              <a:rPr lang="es-ES_tradnl" sz="2000" dirty="0"/>
-              <a:t> del curso con material y enlaces</a:t>
+              <a:t> de GitHub del curso con material y enlaces</a:t>
             </a:r>
           </a:p>
           <a:p>
@@ -29973,14 +29719,14 @@
               </a:lnSpc>
             </a:pPr>
             <a:r>
-              <a:rPr lang="es-ES_tradnl" sz="2000" dirty="0">
+              <a:rPr lang="es-ES_tradnl" sz="2000" dirty="0" err="1">
                 <a:hlinkClick r:id="rId5"/>
               </a:rPr>
-              <a:t>Kaggle</a:t>
+              <a:t>Databricks</a:t>
             </a:r>
             <a:r>
               <a:rPr lang="es-ES_tradnl" sz="2000" dirty="0"/>
-              <a:t> para datos, problemas y actividades de aprendizaje</a:t>
+              <a:t> para aprender el uso de la plataforma de datos</a:t>
             </a:r>
           </a:p>
           <a:p>
@@ -29993,7 +29739,24 @@
               <a:rPr lang="es-ES_tradnl" sz="2000" dirty="0">
                 <a:hlinkClick r:id="rId6"/>
               </a:rPr>
-              <a:t>Github</a:t>
+              <a:t>AWS Academy</a:t>
+            </a:r>
+            <a:r>
+              <a:rPr lang="es-ES_tradnl" sz="2000" dirty="0"/>
+              <a:t> para aprender a trabajar en la nube</a:t>
+            </a:r>
+          </a:p>
+          <a:p>
+            <a:pPr>
+              <a:lnSpc>
+                <a:spcPct val="110000"/>
+              </a:lnSpc>
+            </a:pPr>
+            <a:r>
+              <a:rPr lang="es-ES_tradnl" sz="2000" dirty="0">
+                <a:hlinkClick r:id="rId7"/>
+              </a:rPr>
+              <a:t>GitHub</a:t>
             </a:r>
             <a:r>
               <a:rPr lang="es-ES_tradnl" sz="2000" dirty="0"/>
@@ -30008,7 +29771,7 @@
             </a:pPr>
             <a:r>
               <a:rPr lang="es-ES_tradnl" sz="2000" dirty="0">
-                <a:hlinkClick r:id="rId7"/>
+                <a:hlinkClick r:id="rId8"/>
               </a:rPr>
               <a:t>Medium</a:t>
             </a:r>
@@ -30388,7 +30151,7 @@
             <p:ph idx="1"/>
             <p:extLst>
               <p:ext uri="{D42A27DB-BD31-4B8C-83A1-F6EECF244321}">
-                <p14:modId xmlns:p14="http://schemas.microsoft.com/office/powerpoint/2010/main" val="1017694218"/>
+                <p14:modId xmlns:p14="http://schemas.microsoft.com/office/powerpoint/2010/main" val="477654840"/>
               </p:ext>
             </p:extLst>
           </p:nvPr>
@@ -30725,9 +30488,7 @@
           <a:prstGeom prst="roundRect">
             <a:avLst/>
           </a:prstGeom>
-          <a:solidFill>
-            <a:srgbClr val="C00000"/>
-          </a:solidFill>
+          <a:noFill/>
         </p:spPr>
         <p:style>
           <a:lnRef idx="2">
@@ -30751,9 +30512,14 @@
           <a:p>
             <a:pPr algn="ctr"/>
             <a:r>
-              <a:rPr lang="es-ES_tradnl" sz="2000">
+              <a:rPr lang="es-ES_tradnl" sz="2000" dirty="0">
+                <a:ln>
+                  <a:solidFill>
+                    <a:sysClr val="windowText" lastClr="000000"/>
+                  </a:solidFill>
+                </a:ln>
                 <a:solidFill>
-                  <a:schemeClr val="tx1"/>
+                  <a:sysClr val="windowText" lastClr="000000"/>
                 </a:solidFill>
               </a:rPr>
               <a:t>Hacer una pregunta interesante</a:t>
@@ -31014,7 +30780,16 @@
           <a:p>
             <a:pPr algn="ctr"/>
             <a:r>
-              <a:rPr lang="es-ES_tradnl"/>
+              <a:rPr lang="es-ES_tradnl" dirty="0">
+                <a:ln>
+                  <a:solidFill>
+                    <a:sysClr val="windowText" lastClr="000000"/>
+                  </a:solidFill>
+                </a:ln>
+                <a:solidFill>
+                  <a:sysClr val="windowText" lastClr="000000"/>
+                </a:solidFill>
+              </a:rPr>
               <a:t>Modelado</a:t>
             </a:r>
           </a:p>
@@ -31040,9 +30815,7 @@
           <a:prstGeom prst="roundRect">
             <a:avLst/>
           </a:prstGeom>
-          <a:solidFill>
-            <a:srgbClr val="C00000"/>
-          </a:solidFill>
+          <a:noFill/>
         </p:spPr>
         <p:style>
           <a:lnRef idx="2">
@@ -31066,7 +30839,16 @@
           <a:p>
             <a:pPr algn="ctr"/>
             <a:r>
-              <a:rPr lang="es-ES_tradnl" sz="2000"/>
+              <a:rPr lang="es-ES_tradnl" sz="2000" dirty="0">
+                <a:ln>
+                  <a:solidFill>
+                    <a:sysClr val="windowText" lastClr="000000"/>
+                  </a:solidFill>
+                </a:ln>
+                <a:solidFill>
+                  <a:sysClr val="windowText" lastClr="000000"/>
+                </a:solidFill>
+              </a:rPr>
               <a:t>Comunica y visualiza los resultados</a:t>
             </a:r>
           </a:p>
@@ -31389,11 +31171,11 @@
             </a:avLst>
           </a:prstGeom>
           <a:solidFill>
-            <a:srgbClr val="C00000"/>
+            <a:srgbClr val="FFC000"/>
           </a:solidFill>
           <a:ln>
             <a:solidFill>
-              <a:schemeClr val="bg1"/>
+              <a:srgbClr val="FFC000"/>
             </a:solidFill>
           </a:ln>
         </p:spPr>
@@ -31447,8 +31229,13 @@
             </a:avLst>
           </a:prstGeom>
           <a:solidFill>
-            <a:srgbClr val="C00000"/>
+            <a:srgbClr val="FFC000"/>
           </a:solidFill>
+          <a:ln>
+            <a:solidFill>
+              <a:srgbClr val="FFC000"/>
+            </a:solidFill>
+          </a:ln>
         </p:spPr>
         <p:style>
           <a:lnRef idx="2">
@@ -31500,8 +31287,13 @@
             </a:avLst>
           </a:prstGeom>
           <a:solidFill>
-            <a:srgbClr val="C00000"/>
+            <a:srgbClr val="FFC000"/>
           </a:solidFill>
+          <a:ln>
+            <a:solidFill>
+              <a:srgbClr val="FFC000"/>
+            </a:solidFill>
+          </a:ln>
         </p:spPr>
         <p:style>
           <a:lnRef idx="2">
@@ -31542,8 +31334,8 @@
         </p:nvSpPr>
         <p:spPr>
           <a:xfrm>
-            <a:off x="8744695" y="2133600"/>
-            <a:ext cx="2228105" cy="1816912"/>
+            <a:off x="8744695" y="1988879"/>
+            <a:ext cx="2410985" cy="1961633"/>
           </a:xfrm>
           <a:prstGeom prst="star16">
             <a:avLst>
@@ -31579,7 +31371,7 @@
           <a:p>
             <a:pPr algn="ctr"/>
             <a:r>
-              <a:rPr lang="es-ES_tradnl" sz="2000">
+              <a:rPr lang="es-ES_tradnl" sz="2000" dirty="0">
                 <a:solidFill>
                   <a:srgbClr val="C00000"/>
                 </a:solidFill>

</xml_diff>